<commit_message>
updated the PPT deck for discussion
</commit_message>
<xml_diff>
--- a/doc/duckwork.pptx
+++ b/doc/duckwork.pptx
@@ -15,6 +15,9 @@
     <p:sldId id="263" r:id="rId10"/>
     <p:sldId id="264" r:id="rId11"/>
     <p:sldId id="265" r:id="rId12"/>
+    <p:sldId id="266" r:id="rId13"/>
+    <p:sldId id="267" r:id="rId14"/>
+    <p:sldId id="268" r:id="rId15"/>
   </p:sldIdLst>
   <p:sldSz cx="10077450" cy="5668963"/>
   <p:notesSz cx="7559675" cy="10691813"/>
@@ -72,7 +75,7 @@
         <p:txBody>
           <a:bodyPr/>
           <a:p>
-            <a:fld id="{99F95979-AE57-4CB9-A8D7-2DE9079FCE2B}" type="slidenum">
+            <a:fld id="{18A69B8A-D5C1-4852-B98F-262EC7476159}" type="slidenum">
               <a:t>&lt;#&gt;</a:t>
             </a:fld>
           </a:p>
@@ -281,7 +284,7 @@
         <p:txBody>
           <a:bodyPr/>
           <a:p>
-            <a:fld id="{66112209-09DB-4C1B-A3BC-FD7F37C4054F}" type="slidenum">
+            <a:fld id="{AF5982A5-6BB0-4C35-8224-1F9D62DF71D2}" type="slidenum">
               <a:t>&lt;#&gt;</a:t>
             </a:fld>
           </a:p>
@@ -576,7 +579,7 @@
         <p:txBody>
           <a:bodyPr/>
           <a:p>
-            <a:fld id="{7F1C4DA3-EA91-4A3C-BE05-4F3CD8553705}" type="slidenum">
+            <a:fld id="{9C49EA2A-BE8C-429E-9C06-CAA17DC150BC}" type="slidenum">
               <a:t>&lt;#&gt;</a:t>
             </a:fld>
           </a:p>
@@ -957,7 +960,7 @@
         <p:txBody>
           <a:bodyPr/>
           <a:p>
-            <a:fld id="{52649EA6-349D-461D-AE3D-4E1B1220C899}" type="slidenum">
+            <a:fld id="{44E243D2-2A77-4668-A7A4-3E81439FE87F}" type="slidenum">
               <a:t>&lt;#&gt;</a:t>
             </a:fld>
           </a:p>
@@ -1120,7 +1123,7 @@
         <p:txBody>
           <a:bodyPr/>
           <a:p>
-            <a:fld id="{3E41E2E2-C57D-4759-A5AF-D089F2E0B9F6}" type="slidenum">
+            <a:fld id="{2A52F1CF-4C00-43FA-8DEE-22C27F5DAE50}" type="slidenum">
               <a:t>&lt;#&gt;</a:t>
             </a:fld>
           </a:p>
@@ -1286,7 +1289,7 @@
         <p:txBody>
           <a:bodyPr/>
           <a:p>
-            <a:fld id="{B6A9000C-E7CB-4C3A-9EE5-BA776CA760AC}" type="slidenum">
+            <a:fld id="{56F81C5D-E201-4224-AD4B-0B1C9920CC01}" type="slidenum">
               <a:t>&lt;#&gt;</a:t>
             </a:fld>
           </a:p>
@@ -1495,7 +1498,7 @@
         <p:txBody>
           <a:bodyPr/>
           <a:p>
-            <a:fld id="{866FD733-D0FA-4054-A707-D77DA153A104}" type="slidenum">
+            <a:fld id="{A2A82203-B2B9-49EF-B5C8-0A1CF693837B}" type="slidenum">
               <a:t>&lt;#&gt;</a:t>
             </a:fld>
           </a:p>
@@ -1618,7 +1621,7 @@
         <p:txBody>
           <a:bodyPr/>
           <a:p>
-            <a:fld id="{99FBEA84-DE09-4474-BB98-72B623A71305}" type="slidenum">
+            <a:fld id="{191208D0-C5AA-4015-9AE6-9E0853418997}" type="slidenum">
               <a:t>&lt;#&gt;</a:t>
             </a:fld>
           </a:p>
@@ -1739,7 +1742,7 @@
         <p:txBody>
           <a:bodyPr/>
           <a:p>
-            <a:fld id="{ED485B15-14BD-489D-9545-8FE688540D0C}" type="slidenum">
+            <a:fld id="{7C7264F2-52FE-4628-A6DF-1E0187ED4328}" type="slidenum">
               <a:t>&lt;#&gt;</a:t>
             </a:fld>
           </a:p>
@@ -1991,7 +1994,7 @@
         <p:txBody>
           <a:bodyPr/>
           <a:p>
-            <a:fld id="{5101CC2C-2685-4D86-95E7-78E006D6098F}" type="slidenum">
+            <a:fld id="{7814B1E0-03A3-4733-B929-8E78D3FCE71F}" type="slidenum">
               <a:t>&lt;#&gt;</a:t>
             </a:fld>
           </a:p>
@@ -2243,7 +2246,7 @@
         <p:txBody>
           <a:bodyPr/>
           <a:p>
-            <a:fld id="{1BC213EE-125B-47A6-B08B-07054E91E8AB}" type="slidenum">
+            <a:fld id="{46F23C90-0794-4F2A-A611-29F107EC8679}" type="slidenum">
               <a:t>&lt;#&gt;</a:t>
             </a:fld>
           </a:p>
@@ -2495,7 +2498,7 @@
         <p:txBody>
           <a:bodyPr/>
           <a:p>
-            <a:fld id="{84798B86-7977-4F0C-A6A4-09D3E4A64DBE}" type="slidenum">
+            <a:fld id="{98AAB573-FEBE-409C-992F-2A71ACA9577F}" type="slidenum">
               <a:t>&lt;#&gt;</a:t>
             </a:fld>
           </a:p>
@@ -3220,7 +3223,7 @@
             <a:pPr indent="0" algn="r">
               <a:buNone/>
             </a:pPr>
-            <a:fld id="{5D28F427-00CD-4C0C-B2D7-D97B46C0A97B}" type="slidenum">
+            <a:fld id="{26A30E1B-FCAC-4B33-8E06-AFB943CDC3AD}" type="slidenum">
               <a:rPr b="0" lang="en-US" sz="1400" spc="-1" strike="noStrike">
                 <a:solidFill>
                   <a:srgbClr val="eeeeee"/>
@@ -3541,7 +3544,7 @@
       </p:grpSpPr>
       <p:sp>
         <p:nvSpPr>
-          <p:cNvPr id="68" name="PlaceHolder 1"/>
+          <p:cNvPr id="66" name="PlaceHolder 1"/>
           <p:cNvSpPr>
             <a:spLocks noGrp="1"/>
           </p:cNvSpPr>
@@ -3570,6 +3573,15 @@
             <a:pPr indent="0">
               <a:buNone/>
             </a:pPr>
+            <a:r>
+              <a:rPr b="0" lang="en-US" sz="2700" spc="-1" strike="noStrike">
+                <a:solidFill>
+                  <a:srgbClr val="000000"/>
+                </a:solidFill>
+                <a:latin typeface="Arial"/>
+              </a:rPr>
+              <a:t>Flow Protocol – previewing a record</a:t>
+            </a:r>
             <a:endParaRPr b="0" lang="en-US" sz="2700" spc="-1" strike="noStrike">
               <a:solidFill>
                 <a:srgbClr val="000000"/>
@@ -3581,7 +3593,904 @@
       </p:sp>
       <p:sp>
         <p:nvSpPr>
-          <p:cNvPr id="69" name="PlaceHolder 2"/>
+          <p:cNvPr id="67" name="PlaceHolder 2"/>
+          <p:cNvSpPr>
+            <a:spLocks noGrp="1"/>
+          </p:cNvSpPr>
+          <p:nvPr>
+            <p:ph/>
+          </p:nvPr>
+        </p:nvSpPr>
+        <p:spPr>
+          <a:xfrm>
+            <a:off x="685800" y="1371600"/>
+            <a:ext cx="2514600" cy="3599640"/>
+          </a:xfrm>
+          <a:prstGeom prst="rect">
+            <a:avLst/>
+          </a:prstGeom>
+          <a:noFill/>
+          <a:ln w="0">
+            <a:noFill/>
+          </a:ln>
+        </p:spPr>
+        <p:txBody>
+          <a:bodyPr lIns="0" rIns="0" tIns="0" bIns="0" anchor="t">
+            <a:normAutofit/>
+          </a:bodyPr>
+          <a:p>
+            <a:pPr indent="0">
+              <a:spcAft>
+                <a:spcPts val="1054"/>
+              </a:spcAft>
+              <a:buNone/>
+            </a:pPr>
+            <a:endParaRPr b="0" lang="en-US" sz="2000" spc="-1" strike="noStrike">
+              <a:solidFill>
+                <a:srgbClr val="000000"/>
+              </a:solidFill>
+              <a:latin typeface="Arial"/>
+            </a:endParaRPr>
+          </a:p>
+          <a:p>
+            <a:pPr indent="0">
+              <a:spcAft>
+                <a:spcPts val="1054"/>
+              </a:spcAft>
+              <a:buNone/>
+            </a:pPr>
+            <a:r>
+              <a:rPr b="0" lang="en-US" sz="2000" spc="-1" strike="noStrike">
+                <a:solidFill>
+                  <a:srgbClr val="000000"/>
+                </a:solidFill>
+                <a:latin typeface="Arial"/>
+              </a:rPr>
+              <a:t>Producer has 1234 bytes to send, calls an ‘</a:t>
+            </a:r>
+            <a:r>
+              <a:rPr b="0" lang="en-US" sz="2000" spc="-1" strike="noStrike">
+                <a:solidFill>
+                  <a:srgbClr val="000000"/>
+                </a:solidFill>
+                <a:latin typeface="Courier New"/>
+              </a:rPr>
+              <a:t>OUTPUT</a:t>
+            </a:r>
+            <a:r>
+              <a:rPr b="0" lang="en-US" sz="2000" spc="-1" strike="noStrike">
+                <a:solidFill>
+                  <a:srgbClr val="000000"/>
+                </a:solidFill>
+                <a:latin typeface="Arial"/>
+              </a:rPr>
+              <a:t>’, passes metadata and blocks</a:t>
+            </a:r>
+            <a:endParaRPr b="0" lang="en-US" sz="2000" spc="-1" strike="noStrike">
+              <a:solidFill>
+                <a:srgbClr val="000000"/>
+              </a:solidFill>
+              <a:latin typeface="Arial"/>
+            </a:endParaRPr>
+          </a:p>
+          <a:p>
+            <a:pPr indent="0">
+              <a:spcAft>
+                <a:spcPts val="1054"/>
+              </a:spcAft>
+              <a:buNone/>
+            </a:pPr>
+            <a:endParaRPr b="0" lang="en-US" sz="2000" spc="-1" strike="noStrike">
+              <a:solidFill>
+                <a:srgbClr val="000000"/>
+              </a:solidFill>
+              <a:latin typeface="Arial"/>
+            </a:endParaRPr>
+          </a:p>
+          <a:p>
+            <a:pPr indent="0">
+              <a:spcAft>
+                <a:spcPts val="1054"/>
+              </a:spcAft>
+              <a:buNone/>
+            </a:pPr>
+            <a:r>
+              <a:rPr b="0" lang="en-US" sz="2000" spc="-1" strike="noStrike">
+                <a:solidFill>
+                  <a:srgbClr val="000000"/>
+                </a:solidFill>
+                <a:latin typeface="Arial"/>
+              </a:rPr>
+              <a:t>When consumer returns “</a:t>
+            </a:r>
+            <a:r>
+              <a:rPr b="0" lang="en-US" sz="2000" spc="-1" strike="noStrike">
+                <a:solidFill>
+                  <a:srgbClr val="000000"/>
+                </a:solidFill>
+                <a:latin typeface="Courier New"/>
+              </a:rPr>
+              <a:t>PEEK</a:t>
+            </a:r>
+            <a:r>
+              <a:rPr b="0" lang="en-US" sz="2000" spc="-1" strike="noStrike">
+                <a:solidFill>
+                  <a:srgbClr val="000000"/>
+                </a:solidFill>
+                <a:latin typeface="Arial"/>
+              </a:rPr>
+              <a:t>”, producer restarts</a:t>
+            </a:r>
+            <a:endParaRPr b="0" lang="en-US" sz="2000" spc="-1" strike="noStrike">
+              <a:solidFill>
+                <a:srgbClr val="000000"/>
+              </a:solidFill>
+              <a:latin typeface="Arial"/>
+            </a:endParaRPr>
+          </a:p>
+          <a:p>
+            <a:pPr indent="0">
+              <a:spcAft>
+                <a:spcPts val="1054"/>
+              </a:spcAft>
+              <a:buNone/>
+            </a:pPr>
+            <a:endParaRPr b="0" lang="en-US" sz="2000" spc="-1" strike="noStrike">
+              <a:solidFill>
+                <a:srgbClr val="000000"/>
+              </a:solidFill>
+              <a:latin typeface="Arial"/>
+            </a:endParaRPr>
+          </a:p>
+        </p:txBody>
+      </p:sp>
+      <p:sp>
+        <p:nvSpPr>
+          <p:cNvPr id="68" name="PlaceHolder 3"/>
+          <p:cNvSpPr>
+            <a:spLocks noGrp="1"/>
+          </p:cNvSpPr>
+          <p:nvPr>
+            <p:ph/>
+          </p:nvPr>
+        </p:nvSpPr>
+        <p:spPr>
+          <a:xfrm>
+            <a:off x="6858000" y="1350000"/>
+            <a:ext cx="2514600" cy="3599640"/>
+          </a:xfrm>
+          <a:prstGeom prst="rect">
+            <a:avLst/>
+          </a:prstGeom>
+          <a:noFill/>
+          <a:ln w="0">
+            <a:noFill/>
+          </a:ln>
+        </p:spPr>
+        <p:txBody>
+          <a:bodyPr lIns="0" rIns="0" tIns="0" bIns="0" anchor="t">
+            <a:normAutofit/>
+          </a:bodyPr>
+          <a:p>
+            <a:pPr indent="0" algn="r">
+              <a:spcAft>
+                <a:spcPts val="1054"/>
+              </a:spcAft>
+              <a:buNone/>
+            </a:pPr>
+            <a:endParaRPr b="0" lang="en-US" sz="2000" spc="-1" strike="noStrike">
+              <a:solidFill>
+                <a:srgbClr val="000000"/>
+              </a:solidFill>
+              <a:latin typeface="Arial"/>
+            </a:endParaRPr>
+          </a:p>
+          <a:p>
+            <a:pPr indent="0" algn="r">
+              <a:spcAft>
+                <a:spcPts val="1054"/>
+              </a:spcAft>
+              <a:buNone/>
+            </a:pPr>
+            <a:r>
+              <a:rPr b="0" lang="en-US" sz="2000" spc="-1" strike="noStrike">
+                <a:solidFill>
+                  <a:srgbClr val="000000"/>
+                </a:solidFill>
+                <a:latin typeface="Arial"/>
+              </a:rPr>
+              <a:t>Consumer issues a ‘</a:t>
+            </a:r>
+            <a:r>
+              <a:rPr b="0" lang="en-US" sz="2000" spc="-1" strike="noStrike">
+                <a:solidFill>
+                  <a:srgbClr val="000000"/>
+                </a:solidFill>
+                <a:latin typeface="Courier New"/>
+              </a:rPr>
+              <a:t>PEEKTO</a:t>
+            </a:r>
+            <a:r>
+              <a:rPr b="0" lang="en-US" sz="2000" spc="-1" strike="noStrike">
+                <a:solidFill>
+                  <a:srgbClr val="000000"/>
+                </a:solidFill>
+                <a:latin typeface="Arial"/>
+              </a:rPr>
+              <a:t>’ </a:t>
+            </a:r>
+            <a:r>
+              <a:rPr b="0" lang="en-US" sz="2000" spc="-1" strike="noStrike">
+                <a:solidFill>
+                  <a:srgbClr val="000000"/>
+                </a:solidFill>
+                <a:latin typeface="Arial"/>
+              </a:rPr>
+              <a:t>and drives the transaction.</a:t>
+            </a:r>
+            <a:br>
+              <a:rPr sz="2000"/>
+            </a:br>
+            <a:r>
+              <a:rPr b="0" lang="en-US" sz="2000" spc="-1" strike="noStrike">
+                <a:solidFill>
+                  <a:srgbClr val="000000"/>
+                </a:solidFill>
+                <a:latin typeface="Arial"/>
+              </a:rPr>
+              <a:t> It confirms that its buffer can hold the record coming, returns “</a:t>
+            </a:r>
+            <a:r>
+              <a:rPr b="0" lang="en-US" sz="2000" spc="-1" strike="noStrike">
+                <a:solidFill>
+                  <a:srgbClr val="000000"/>
+                </a:solidFill>
+                <a:latin typeface="Courier New"/>
+              </a:rPr>
+              <a:t>PEEK</a:t>
+            </a:r>
+            <a:r>
+              <a:rPr b="0" lang="en-US" sz="2000" spc="-1" strike="noStrike">
+                <a:solidFill>
+                  <a:srgbClr val="000000"/>
+                </a:solidFill>
+                <a:latin typeface="Arial"/>
+              </a:rPr>
+              <a:t>” and reads, then unblocks</a:t>
+            </a:r>
+            <a:endParaRPr b="0" lang="en-US" sz="2000" spc="-1" strike="noStrike">
+              <a:solidFill>
+                <a:srgbClr val="000000"/>
+              </a:solidFill>
+              <a:latin typeface="Arial"/>
+            </a:endParaRPr>
+          </a:p>
+          <a:p>
+            <a:pPr indent="0" algn="r">
+              <a:spcAft>
+                <a:spcPts val="1054"/>
+              </a:spcAft>
+              <a:buNone/>
+            </a:pPr>
+            <a:endParaRPr b="0" lang="en-US" sz="2000" spc="-1" strike="noStrike">
+              <a:solidFill>
+                <a:srgbClr val="000000"/>
+              </a:solidFill>
+              <a:latin typeface="Arial"/>
+            </a:endParaRPr>
+          </a:p>
+        </p:txBody>
+      </p:sp>
+      <p:sp>
+        <p:nvSpPr>
+          <p:cNvPr id="69" name="PlaceHolder 4"/>
+          <p:cNvSpPr>
+            <a:spLocks noGrp="1"/>
+          </p:cNvSpPr>
+          <p:nvPr>
+            <p:ph/>
+          </p:nvPr>
+        </p:nvSpPr>
+        <p:spPr>
+          <a:xfrm>
+            <a:off x="3429000" y="1350000"/>
+            <a:ext cx="3200400" cy="3599640"/>
+          </a:xfrm>
+          <a:prstGeom prst="rect">
+            <a:avLst/>
+          </a:prstGeom>
+          <a:noFill/>
+          <a:ln w="0">
+            <a:noFill/>
+          </a:ln>
+        </p:spPr>
+        <p:txBody>
+          <a:bodyPr lIns="0" rIns="0" tIns="0" bIns="0" anchor="t">
+            <a:normAutofit/>
+          </a:bodyPr>
+          <a:p>
+            <a:pPr indent="0">
+              <a:spcAft>
+                <a:spcPts val="1054"/>
+              </a:spcAft>
+              <a:buNone/>
+            </a:pPr>
+            <a:r>
+              <a:rPr b="0" lang="en-US" sz="2000" spc="-1" strike="noStrike">
+                <a:solidFill>
+                  <a:srgbClr val="000000"/>
+                </a:solidFill>
+                <a:latin typeface="Arial"/>
+              </a:rPr>
+              <a:t>fdforward               fdreverse</a:t>
+            </a:r>
+            <a:endParaRPr b="0" lang="en-US" sz="2000" spc="-1" strike="noStrike">
+              <a:solidFill>
+                <a:srgbClr val="000000"/>
+              </a:solidFill>
+              <a:latin typeface="Arial"/>
+            </a:endParaRPr>
+          </a:p>
+          <a:p>
+            <a:pPr indent="0" algn="r">
+              <a:spcAft>
+                <a:spcPts val="1054"/>
+              </a:spcAft>
+              <a:buNone/>
+            </a:pPr>
+            <a:r>
+              <a:rPr b="0" lang="en-US" sz="2000" spc="-1" strike="noStrike">
+                <a:solidFill>
+                  <a:srgbClr val="000000"/>
+                </a:solidFill>
+                <a:latin typeface="Arial"/>
+              </a:rPr>
+              <a:t> ←   “</a:t>
+            </a:r>
+            <a:r>
+              <a:rPr b="1" lang="en-US" sz="2000" spc="-1" strike="noStrike">
+                <a:solidFill>
+                  <a:srgbClr val="000000"/>
+                </a:solidFill>
+                <a:latin typeface="Courier New"/>
+              </a:rPr>
+              <a:t>STAT</a:t>
+            </a:r>
+            <a:r>
+              <a:rPr b="0" lang="en-US" sz="2000" spc="-1" strike="noStrike">
+                <a:solidFill>
+                  <a:srgbClr val="000000"/>
+                </a:solidFill>
+                <a:latin typeface="Arial"/>
+              </a:rPr>
+              <a:t>”</a:t>
+            </a:r>
+            <a:endParaRPr b="0" lang="en-US" sz="2000" spc="-1" strike="noStrike">
+              <a:solidFill>
+                <a:srgbClr val="000000"/>
+              </a:solidFill>
+              <a:latin typeface="Arial"/>
+            </a:endParaRPr>
+          </a:p>
+          <a:p>
+            <a:pPr indent="0">
+              <a:spcAft>
+                <a:spcPts val="1054"/>
+              </a:spcAft>
+              <a:buNone/>
+            </a:pPr>
+            <a:r>
+              <a:rPr b="0" lang="en-US" sz="2000" spc="-1" strike="noStrike">
+                <a:solidFill>
+                  <a:srgbClr val="000000"/>
+                </a:solidFill>
+                <a:latin typeface="Arial"/>
+              </a:rPr>
+              <a:t>“</a:t>
+            </a:r>
+            <a:r>
+              <a:rPr b="1" lang="en-US" sz="2000" spc="-1" strike="noStrike">
+                <a:solidFill>
+                  <a:srgbClr val="000000"/>
+                </a:solidFill>
+                <a:latin typeface="Courier New"/>
+              </a:rPr>
+              <a:t>DATA 1234</a:t>
+            </a:r>
+            <a:r>
+              <a:rPr b="0" lang="en-US" sz="2000" spc="-1" strike="noStrike">
+                <a:solidFill>
+                  <a:srgbClr val="000000"/>
+                </a:solidFill>
+                <a:latin typeface="Arial"/>
+              </a:rPr>
+              <a:t>”</a:t>
+            </a:r>
+            <a:r>
+              <a:rPr b="0" lang="en-US" sz="2000" spc="-1" strike="noStrike">
+                <a:solidFill>
+                  <a:srgbClr val="000000"/>
+                </a:solidFill>
+                <a:latin typeface="Arial"/>
+              </a:rPr>
+              <a:t>   → </a:t>
+            </a:r>
+            <a:endParaRPr b="0" lang="en-US" sz="2000" spc="-1" strike="noStrike">
+              <a:solidFill>
+                <a:srgbClr val="000000"/>
+              </a:solidFill>
+              <a:latin typeface="Arial"/>
+            </a:endParaRPr>
+          </a:p>
+          <a:p>
+            <a:pPr indent="0" algn="r">
+              <a:spcAft>
+                <a:spcPts val="1054"/>
+              </a:spcAft>
+              <a:buNone/>
+            </a:pPr>
+            <a:r>
+              <a:rPr b="0" lang="en-US" sz="2000" spc="-1" strike="noStrike">
+                <a:solidFill>
+                  <a:srgbClr val="000000"/>
+                </a:solidFill>
+                <a:latin typeface="Arial"/>
+              </a:rPr>
+              <a:t> ←   “</a:t>
+            </a:r>
+            <a:r>
+              <a:rPr b="1" lang="en-US" sz="2000" spc="-1" strike="noStrike">
+                <a:solidFill>
+                  <a:srgbClr val="000000"/>
+                </a:solidFill>
+                <a:latin typeface="Courier New"/>
+              </a:rPr>
+              <a:t>PEEK 1234</a:t>
+            </a:r>
+            <a:r>
+              <a:rPr b="0" lang="en-US" sz="2000" spc="-1" strike="noStrike">
+                <a:solidFill>
+                  <a:srgbClr val="000000"/>
+                </a:solidFill>
+                <a:latin typeface="Arial"/>
+              </a:rPr>
+              <a:t>”</a:t>
+            </a:r>
+            <a:endParaRPr b="0" lang="en-US" sz="2000" spc="-1" strike="noStrike">
+              <a:solidFill>
+                <a:srgbClr val="000000"/>
+              </a:solidFill>
+              <a:latin typeface="Arial"/>
+            </a:endParaRPr>
+          </a:p>
+          <a:p>
+            <a:pPr indent="0">
+              <a:spcAft>
+                <a:spcPts val="1054"/>
+              </a:spcAft>
+              <a:buNone/>
+            </a:pPr>
+            <a:r>
+              <a:rPr b="0" i="1" lang="en-US" sz="2000" spc="-1" strike="noStrike">
+                <a:solidFill>
+                  <a:srgbClr val="000000"/>
+                </a:solidFill>
+                <a:latin typeface="Arial"/>
+              </a:rPr>
+              <a:t>1234 bytes of data</a:t>
+            </a:r>
+            <a:r>
+              <a:rPr b="0" i="1" lang="en-US" sz="2000" spc="-1" strike="noStrike">
+                <a:solidFill>
+                  <a:srgbClr val="000000"/>
+                </a:solidFill>
+                <a:latin typeface="Arial"/>
+              </a:rPr>
+              <a:t>   → </a:t>
+            </a:r>
+            <a:endParaRPr b="0" lang="en-US" sz="2000" spc="-1" strike="noStrike">
+              <a:solidFill>
+                <a:srgbClr val="000000"/>
+              </a:solidFill>
+              <a:latin typeface="Arial"/>
+            </a:endParaRPr>
+          </a:p>
+          <a:p>
+            <a:pPr indent="0">
+              <a:spcAft>
+                <a:spcPts val="1054"/>
+              </a:spcAft>
+              <a:buNone/>
+            </a:pPr>
+            <a:endParaRPr b="0" lang="en-US" sz="2000" spc="-1" strike="noStrike">
+              <a:solidFill>
+                <a:srgbClr val="000000"/>
+              </a:solidFill>
+              <a:latin typeface="Arial"/>
+            </a:endParaRPr>
+          </a:p>
+          <a:p>
+            <a:pPr indent="0">
+              <a:spcAft>
+                <a:spcPts val="1054"/>
+              </a:spcAft>
+              <a:buNone/>
+            </a:pPr>
+            <a:endParaRPr b="0" lang="en-US" sz="2000" spc="-1" strike="noStrike">
+              <a:solidFill>
+                <a:srgbClr val="000000"/>
+              </a:solidFill>
+              <a:latin typeface="Arial"/>
+            </a:endParaRPr>
+          </a:p>
+          <a:p>
+            <a:pPr indent="0">
+              <a:spcAft>
+                <a:spcPts val="1054"/>
+              </a:spcAft>
+              <a:buNone/>
+            </a:pPr>
+            <a:r>
+              <a:rPr b="0" lang="en-US" sz="2000" spc="-1" strike="noStrike">
+                <a:solidFill>
+                  <a:srgbClr val="000000"/>
+                </a:solidFill>
+                <a:latin typeface="Arial"/>
+              </a:rPr>
+              <a:t>This </a:t>
+            </a:r>
+            <a:r>
+              <a:rPr b="0" i="1" lang="en-US" sz="2000" spc="-1" strike="noStrike">
+                <a:solidFill>
+                  <a:srgbClr val="000000"/>
+                </a:solidFill>
+                <a:latin typeface="Arial"/>
+              </a:rPr>
+              <a:t>does not</a:t>
+            </a:r>
+            <a:r>
+              <a:rPr b="0" lang="en-US" sz="2000" spc="-1" strike="noStrike">
+                <a:solidFill>
+                  <a:srgbClr val="000000"/>
+                </a:solidFill>
+                <a:latin typeface="Arial"/>
+              </a:rPr>
+              <a:t> unblock </a:t>
+            </a:r>
+            <a:br>
+              <a:rPr sz="2000"/>
+            </a:br>
+            <a:r>
+              <a:rPr b="0" lang="en-US" sz="2000" spc="-1" strike="noStrike">
+                <a:solidFill>
+                  <a:srgbClr val="000000"/>
+                </a:solidFill>
+                <a:latin typeface="Arial"/>
+              </a:rPr>
+              <a:t>the producer</a:t>
+            </a:r>
+            <a:endParaRPr b="0" lang="en-US" sz="2000" spc="-1" strike="noStrike">
+              <a:solidFill>
+                <a:srgbClr val="000000"/>
+              </a:solidFill>
+              <a:latin typeface="Arial"/>
+            </a:endParaRPr>
+          </a:p>
+          <a:p>
+            <a:pPr indent="0">
+              <a:spcAft>
+                <a:spcPts val="1054"/>
+              </a:spcAft>
+              <a:buNone/>
+            </a:pPr>
+            <a:endParaRPr b="0" lang="en-US" sz="2000" spc="-1" strike="noStrike">
+              <a:solidFill>
+                <a:srgbClr val="000000"/>
+              </a:solidFill>
+              <a:latin typeface="Arial"/>
+            </a:endParaRPr>
+          </a:p>
+        </p:txBody>
+      </p:sp>
+    </p:spTree>
+  </p:cSld>
+  <mc:AlternateContent>
+    <mc:Choice Requires="p14">
+      <p:transition spd="slow" p14:dur="2000"/>
+    </mc:Choice>
+    <mc:Fallback>
+      <p:transition spd="slow"/>
+    </mc:Fallback>
+  </mc:AlternateContent>
+</p:sld>
+</file>
+
+<file path=ppt/slides/slide11.xml><?xml version="1.0" encoding="utf-8"?>
+<p:sld xmlns:a="http://schemas.openxmlformats.org/drawingml/2006/main" xmlns:p="http://schemas.openxmlformats.org/presentationml/2006/main" xmlns:r="http://schemas.openxmlformats.org/officeDocument/2006/relationships" xmlns:p14="http://schemas.microsoft.com/office/powerpoint/2010/main" xmlns:p15="http://schemas.microsoft.com/office/powerpoint/2012/main" xmlns:mc="http://schemas.openxmlformats.org/markup-compatibility/2006">
+  <p:cSld>
+    <p:spTree>
+      <p:nvGrpSpPr>
+        <p:cNvPr id="1" name=""/>
+        <p:cNvGrpSpPr/>
+        <p:nvPr/>
+      </p:nvGrpSpPr>
+      <p:grpSpPr>
+        <a:xfrm>
+          <a:off x="0" y="0"/>
+          <a:ext cx="0" cy="0"/>
+          <a:chOff x="0" y="0"/>
+          <a:chExt cx="0" cy="0"/>
+        </a:xfrm>
+      </p:grpSpPr>
+      <p:sp>
+        <p:nvSpPr>
+          <p:cNvPr id="70" name="PlaceHolder 1"/>
+          <p:cNvSpPr>
+            <a:spLocks noGrp="1"/>
+          </p:cNvSpPr>
+          <p:nvPr>
+            <p:ph type="title"/>
+          </p:nvPr>
+        </p:nvSpPr>
+        <p:spPr>
+          <a:xfrm>
+            <a:off x="539640" y="449640"/>
+            <a:ext cx="8637120" cy="630000"/>
+          </a:xfrm>
+          <a:prstGeom prst="rect">
+            <a:avLst/>
+          </a:prstGeom>
+          <a:noFill/>
+          <a:ln w="0">
+            <a:noFill/>
+          </a:ln>
+        </p:spPr>
+        <p:txBody>
+          <a:bodyPr lIns="0" rIns="0" tIns="0" bIns="0" anchor="ctr">
+            <a:noAutofit/>
+          </a:bodyPr>
+          <a:p>
+            <a:pPr indent="0">
+              <a:buNone/>
+            </a:pPr>
+            <a:endParaRPr b="0" lang="en-US" sz="2700" spc="-1" strike="noStrike">
+              <a:solidFill>
+                <a:srgbClr val="000000"/>
+              </a:solidFill>
+              <a:latin typeface="Arial"/>
+            </a:endParaRPr>
+          </a:p>
+        </p:txBody>
+      </p:sp>
+      <p:sp>
+        <p:nvSpPr>
+          <p:cNvPr id="71" name="PlaceHolder 2"/>
+          <p:cNvSpPr>
+            <a:spLocks noGrp="1"/>
+          </p:cNvSpPr>
+          <p:nvPr>
+            <p:ph/>
+          </p:nvPr>
+        </p:nvSpPr>
+        <p:spPr>
+          <a:xfrm>
+            <a:off x="539640" y="1349640"/>
+            <a:ext cx="8997120" cy="3599640"/>
+          </a:xfrm>
+          <a:prstGeom prst="rect">
+            <a:avLst/>
+          </a:prstGeom>
+          <a:noFill/>
+          <a:ln w="0">
+            <a:noFill/>
+          </a:ln>
+        </p:spPr>
+        <p:txBody>
+          <a:bodyPr lIns="0" rIns="0" tIns="0" bIns="0" anchor="t">
+            <a:normAutofit/>
+          </a:bodyPr>
+          <a:p>
+            <a:pPr indent="0">
+              <a:spcAft>
+                <a:spcPts val="1054"/>
+              </a:spcAft>
+              <a:buNone/>
+            </a:pPr>
+            <a:endParaRPr b="0" lang="en-US" sz="2000" spc="-1" strike="noStrike">
+              <a:solidFill>
+                <a:srgbClr val="000000"/>
+              </a:solidFill>
+              <a:latin typeface="Arial"/>
+            </a:endParaRPr>
+          </a:p>
+        </p:txBody>
+      </p:sp>
+    </p:spTree>
+  </p:cSld>
+  <mc:AlternateContent>
+    <mc:Choice Requires="p14">
+      <p:transition spd="slow" p14:dur="2000"/>
+    </mc:Choice>
+    <mc:Fallback>
+      <p:transition spd="slow"/>
+    </mc:Fallback>
+  </mc:AlternateContent>
+</p:sld>
+</file>
+
+<file path=ppt/slides/slide12.xml><?xml version="1.0" encoding="utf-8"?>
+<p:sld xmlns:a="http://schemas.openxmlformats.org/drawingml/2006/main" xmlns:p="http://schemas.openxmlformats.org/presentationml/2006/main" xmlns:r="http://schemas.openxmlformats.org/officeDocument/2006/relationships" xmlns:p14="http://schemas.microsoft.com/office/powerpoint/2010/main" xmlns:p15="http://schemas.microsoft.com/office/powerpoint/2012/main" xmlns:mc="http://schemas.openxmlformats.org/markup-compatibility/2006">
+  <p:cSld>
+    <p:spTree>
+      <p:nvGrpSpPr>
+        <p:cNvPr id="1" name=""/>
+        <p:cNvGrpSpPr/>
+        <p:nvPr/>
+      </p:nvGrpSpPr>
+      <p:grpSpPr>
+        <a:xfrm>
+          <a:off x="0" y="0"/>
+          <a:ext cx="0" cy="0"/>
+          <a:chOff x="0" y="0"/>
+          <a:chExt cx="0" cy="0"/>
+        </a:xfrm>
+      </p:grpSpPr>
+      <p:sp>
+        <p:nvSpPr>
+          <p:cNvPr id="72" name="PlaceHolder 1"/>
+          <p:cNvSpPr>
+            <a:spLocks noGrp="1"/>
+          </p:cNvSpPr>
+          <p:nvPr>
+            <p:ph type="title"/>
+          </p:nvPr>
+        </p:nvSpPr>
+        <p:spPr>
+          <a:xfrm>
+            <a:off x="539640" y="449640"/>
+            <a:ext cx="8637120" cy="630000"/>
+          </a:xfrm>
+          <a:prstGeom prst="rect">
+            <a:avLst/>
+          </a:prstGeom>
+          <a:noFill/>
+          <a:ln w="0">
+            <a:noFill/>
+          </a:ln>
+        </p:spPr>
+        <p:txBody>
+          <a:bodyPr lIns="0" rIns="0" tIns="0" bIns="0" anchor="ctr">
+            <a:noAutofit/>
+          </a:bodyPr>
+          <a:p>
+            <a:pPr indent="0">
+              <a:buNone/>
+            </a:pPr>
+            <a:endParaRPr b="0" lang="en-US" sz="2700" spc="-1" strike="noStrike">
+              <a:solidFill>
+                <a:srgbClr val="000000"/>
+              </a:solidFill>
+              <a:latin typeface="Arial"/>
+            </a:endParaRPr>
+          </a:p>
+        </p:txBody>
+      </p:sp>
+      <p:sp>
+        <p:nvSpPr>
+          <p:cNvPr id="73" name="PlaceHolder 2"/>
+          <p:cNvSpPr>
+            <a:spLocks noGrp="1"/>
+          </p:cNvSpPr>
+          <p:nvPr>
+            <p:ph/>
+          </p:nvPr>
+        </p:nvSpPr>
+        <p:spPr>
+          <a:xfrm>
+            <a:off x="539640" y="1349640"/>
+            <a:ext cx="8997120" cy="3599640"/>
+          </a:xfrm>
+          <a:prstGeom prst="rect">
+            <a:avLst/>
+          </a:prstGeom>
+          <a:noFill/>
+          <a:ln w="0">
+            <a:noFill/>
+          </a:ln>
+        </p:spPr>
+        <p:txBody>
+          <a:bodyPr lIns="0" rIns="0" tIns="0" bIns="0" anchor="t">
+            <a:normAutofit/>
+          </a:bodyPr>
+          <a:p>
+            <a:pPr indent="0">
+              <a:spcAft>
+                <a:spcPts val="1054"/>
+              </a:spcAft>
+              <a:buNone/>
+            </a:pPr>
+            <a:endParaRPr b="0" lang="en-US" sz="2000" spc="-1" strike="noStrike">
+              <a:solidFill>
+                <a:srgbClr val="000000"/>
+              </a:solidFill>
+              <a:latin typeface="Arial"/>
+            </a:endParaRPr>
+          </a:p>
+        </p:txBody>
+      </p:sp>
+    </p:spTree>
+  </p:cSld>
+  <mc:AlternateContent>
+    <mc:Choice Requires="p14">
+      <p:transition spd="slow" p14:dur="2000"/>
+    </mc:Choice>
+    <mc:Fallback>
+      <p:transition spd="slow"/>
+    </mc:Fallback>
+  </mc:AlternateContent>
+</p:sld>
+</file>
+
+<file path=ppt/slides/slide13.xml><?xml version="1.0" encoding="utf-8"?>
+<p:sld xmlns:a="http://schemas.openxmlformats.org/drawingml/2006/main" xmlns:p="http://schemas.openxmlformats.org/presentationml/2006/main" xmlns:r="http://schemas.openxmlformats.org/officeDocument/2006/relationships" xmlns:p14="http://schemas.microsoft.com/office/powerpoint/2010/main" xmlns:p15="http://schemas.microsoft.com/office/powerpoint/2012/main" xmlns:mc="http://schemas.openxmlformats.org/markup-compatibility/2006">
+  <p:cSld>
+    <p:spTree>
+      <p:nvGrpSpPr>
+        <p:cNvPr id="1" name=""/>
+        <p:cNvGrpSpPr/>
+        <p:nvPr/>
+      </p:nvGrpSpPr>
+      <p:grpSpPr>
+        <a:xfrm>
+          <a:off x="0" y="0"/>
+          <a:ext cx="0" cy="0"/>
+          <a:chOff x="0" y="0"/>
+          <a:chExt cx="0" cy="0"/>
+        </a:xfrm>
+      </p:grpSpPr>
+      <p:sp>
+        <p:nvSpPr>
+          <p:cNvPr id="74" name="PlaceHolder 1"/>
+          <p:cNvSpPr>
+            <a:spLocks noGrp="1"/>
+          </p:cNvSpPr>
+          <p:nvPr>
+            <p:ph type="title"/>
+          </p:nvPr>
+        </p:nvSpPr>
+        <p:spPr>
+          <a:xfrm>
+            <a:off x="539640" y="449640"/>
+            <a:ext cx="8637120" cy="630000"/>
+          </a:xfrm>
+          <a:prstGeom prst="rect">
+            <a:avLst/>
+          </a:prstGeom>
+          <a:noFill/>
+          <a:ln w="0">
+            <a:noFill/>
+          </a:ln>
+        </p:spPr>
+        <p:txBody>
+          <a:bodyPr lIns="0" rIns="0" tIns="0" bIns="0" anchor="ctr">
+            <a:noAutofit/>
+          </a:bodyPr>
+          <a:p>
+            <a:pPr indent="0">
+              <a:buNone/>
+            </a:pPr>
+            <a:endParaRPr b="0" lang="en-US" sz="2700" spc="-1" strike="noStrike">
+              <a:solidFill>
+                <a:srgbClr val="000000"/>
+              </a:solidFill>
+              <a:latin typeface="Arial"/>
+            </a:endParaRPr>
+          </a:p>
+        </p:txBody>
+      </p:sp>
+      <p:sp>
+        <p:nvSpPr>
+          <p:cNvPr id="75" name="PlaceHolder 2"/>
           <p:cNvSpPr>
             <a:spLocks noGrp="1"/>
           </p:cNvSpPr>
@@ -3993,7 +4902,25 @@
                 </a:solidFill>
                 <a:latin typeface="Arial"/>
               </a:rPr>
-              <a:t>Passing Connectors</a:t>
+              <a:t>Plumbing for POSIX with </a:t>
+            </a:r>
+            <a:r>
+              <a:rPr b="1" lang="en-US" sz="2700" spc="-1" strike="noStrike">
+                <a:solidFill>
+                  <a:srgbClr val="000000"/>
+                </a:solidFill>
+                <a:latin typeface="Courier New"/>
+              </a:rPr>
+              <a:t>pipe()</a:t>
+            </a:r>
+            <a:r>
+              <a:rPr b="0" lang="en-US" sz="2700" spc="-1" strike="noStrike">
+                <a:solidFill>
+                  <a:srgbClr val="000000"/>
+                </a:solidFill>
+                <a:latin typeface="Arial"/>
+              </a:rPr>
+              <a:t> pair </a:t>
             </a:r>
             <a:endParaRPr b="0" lang="en-US" sz="2700" spc="-1" strike="noStrike">
               <a:solidFill>
@@ -4031,143 +4958,6 @@
           <a:bodyPr lIns="0" rIns="0" tIns="0" bIns="0" anchor="t">
             <a:normAutofit/>
           </a:bodyPr>
-          <a:p>
-            <a:pPr indent="0">
-              <a:spcAft>
-                <a:spcPts val="1054"/>
-              </a:spcAft>
-              <a:buNone/>
-            </a:pPr>
-            <a:r>
-              <a:rPr b="0" lang="en-US" sz="2000" spc="-1" strike="noStrike">
-                <a:solidFill>
-                  <a:srgbClr val="000000"/>
-                </a:solidFill>
-                <a:latin typeface="Arial"/>
-              </a:rPr>
-              <a:t>Connector Descriptor passed from dispatcher to stages </a:t>
-            </a:r>
-            <a:endParaRPr b="0" lang="en-US" sz="2000" spc="-1" strike="noStrike">
-              <a:solidFill>
-                <a:srgbClr val="000000"/>
-              </a:solidFill>
-              <a:latin typeface="Arial"/>
-            </a:endParaRPr>
-          </a:p>
-          <a:p>
-            <a:pPr indent="0">
-              <a:spcAft>
-                <a:spcPts val="1054"/>
-              </a:spcAft>
-              <a:buNone/>
-            </a:pPr>
-            <a:endParaRPr b="0" lang="en-US" sz="2000" spc="-1" strike="noStrike">
-              <a:solidFill>
-                <a:srgbClr val="000000"/>
-              </a:solidFill>
-              <a:latin typeface="Arial"/>
-            </a:endParaRPr>
-          </a:p>
-          <a:p>
-            <a:pPr indent="0" algn="ctr">
-              <a:spcAft>
-                <a:spcPts val="1054"/>
-              </a:spcAft>
-              <a:buNone/>
-            </a:pPr>
-            <a:r>
-              <a:rPr b="1" lang="en-US" sz="2000" spc="-1" strike="noStrike">
-                <a:solidFill>
-                  <a:srgbClr val="000000"/>
-                </a:solidFill>
-                <a:latin typeface="Courier New"/>
-              </a:rPr>
-              <a:t>*.</a:t>
-            </a:r>
-            <a:r>
-              <a:rPr b="0" lang="en-US" sz="2000" spc="-1" strike="noStrike">
-                <a:solidFill>
-                  <a:srgbClr val="000000"/>
-                </a:solidFill>
-                <a:latin typeface="Arial"/>
-              </a:rPr>
-              <a:t> [input|output] </a:t>
-            </a:r>
-            <a:r>
-              <a:rPr b="1" lang="en-US" sz="2000" spc="-1" strike="noStrike">
-                <a:solidFill>
-                  <a:srgbClr val="000000"/>
-                </a:solidFill>
-                <a:latin typeface="Courier New"/>
-              </a:rPr>
-              <a:t>.</a:t>
-            </a:r>
-            <a:r>
-              <a:rPr b="0" lang="en-US" sz="2000" spc="-1" strike="noStrike">
-                <a:solidFill>
-                  <a:srgbClr val="000000"/>
-                </a:solidFill>
-                <a:latin typeface="Arial"/>
-              </a:rPr>
-              <a:t> [name|number] </a:t>
-            </a:r>
-            <a:r>
-              <a:rPr b="1" lang="en-US" sz="2000" spc="-1" strike="noStrike">
-                <a:solidFill>
-                  <a:srgbClr val="000000"/>
-                </a:solidFill>
-                <a:latin typeface="Courier New"/>
-              </a:rPr>
-              <a:t>:</a:t>
-            </a:r>
-            <a:r>
-              <a:rPr b="0" lang="en-US" sz="2000" spc="-1" strike="noStrike">
-                <a:solidFill>
-                  <a:srgbClr val="000000"/>
-                </a:solidFill>
-                <a:latin typeface="Arial"/>
-              </a:rPr>
-              <a:t> fdfwd </a:t>
-            </a:r>
-            <a:r>
-              <a:rPr b="1" lang="en-US" sz="2000" spc="-1" strike="noStrike">
-                <a:solidFill>
-                  <a:srgbClr val="000000"/>
-                </a:solidFill>
-                <a:latin typeface="Courier New"/>
-              </a:rPr>
-              <a:t>,</a:t>
-            </a:r>
-            <a:r>
-              <a:rPr b="0" lang="en-US" sz="2000" spc="-1" strike="noStrike">
-                <a:solidFill>
-                  <a:srgbClr val="000000"/>
-                </a:solidFill>
-                <a:latin typeface="Arial"/>
-              </a:rPr>
-              <a:t> fdrev</a:t>
-            </a:r>
-            <a:endParaRPr b="0" lang="en-US" sz="2000" spc="-1" strike="noStrike">
-              <a:solidFill>
-                <a:srgbClr val="000000"/>
-              </a:solidFill>
-              <a:latin typeface="Arial"/>
-            </a:endParaRPr>
-          </a:p>
-          <a:p>
-            <a:pPr indent="0">
-              <a:spcAft>
-                <a:spcPts val="1054"/>
-              </a:spcAft>
-              <a:buNone/>
-            </a:pPr>
-            <a:endParaRPr b="0" lang="en-US" sz="2000" spc="-1" strike="noStrike">
-              <a:solidFill>
-                <a:srgbClr val="000000"/>
-              </a:solidFill>
-              <a:latin typeface="Arial"/>
-            </a:endParaRPr>
-          </a:p>
           <a:p>
             <a:pPr marL="432000" indent="-324000">
               <a:spcAft>
@@ -4187,43 +4977,25 @@
                 </a:solidFill>
                 <a:latin typeface="Arial"/>
               </a:rPr>
-              <a:t>Asterisk, dot, “</a:t>
-            </a:r>
-            <a:r>
-              <a:rPr b="0" lang="en-US" sz="2000" spc="-1" strike="noStrike">
+              <a:t>POSIX </a:t>
+            </a:r>
+            <a:r>
+              <a:rPr b="1" lang="en-US" sz="2000" spc="-1" strike="noStrike">
                 <a:solidFill>
                   <a:srgbClr val="000000"/>
                 </a:solidFill>
                 <a:latin typeface="Courier New"/>
               </a:rPr>
-              <a:t>INPUT</a:t>
-            </a:r>
-            <a:r>
-              <a:rPr b="0" lang="en-US" sz="2000" spc="-1" strike="noStrike">
-                <a:solidFill>
-                  <a:srgbClr val="000000"/>
-                </a:solidFill>
-                <a:latin typeface="Arial"/>
-              </a:rPr>
-              <a:t>” or “</a:t>
-            </a:r>
-            <a:r>
-              <a:rPr b="0" lang="en-US" sz="2000" spc="-1" strike="noStrike">
-                <a:solidFill>
-                  <a:srgbClr val="000000"/>
-                </a:solidFill>
-                <a:latin typeface="Courier New"/>
-              </a:rPr>
-              <a:t>OUTPUT</a:t>
-            </a:r>
-            <a:r>
-              <a:rPr b="0" lang="en-US" sz="2000" spc="-1" strike="noStrike">
-                <a:solidFill>
-                  <a:srgbClr val="000000"/>
-                </a:solidFill>
-                <a:latin typeface="Arial"/>
-              </a:rPr>
-              <a:t>” </a:t>
+              <a:t>pipe()</a:t>
+            </a:r>
+            <a:r>
+              <a:rPr b="0" lang="en-US" sz="2000" spc="-1" strike="noStrike">
+                <a:solidFill>
+                  <a:srgbClr val="000000"/>
+                </a:solidFill>
+                <a:latin typeface="Arial"/>
+              </a:rPr>
+              <a:t> system call returns a pair of file descriptors at the ends of a “leaky garden hose” </a:t>
             </a:r>
             <a:endParaRPr b="0" lang="en-US" sz="2000" spc="-1" strike="noStrike">
               <a:solidFill>
@@ -4245,13 +5017,40 @@
               <a:buChar char=""/>
             </a:pPr>
             <a:r>
-              <a:rPr b="0" lang="en-US" sz="2000" spc="-1" strike="noStrike">
-                <a:solidFill>
-                  <a:srgbClr val="000000"/>
-                </a:solidFill>
-                <a:latin typeface="Arial"/>
-              </a:rPr>
-              <a:t>Dot, stream name or stream number </a:t>
+              <a:rPr b="1" lang="en-US" sz="2000" spc="-1" strike="noStrike">
+                <a:solidFill>
+                  <a:srgbClr val="000000"/>
+                </a:solidFill>
+                <a:latin typeface="Courier New"/>
+              </a:rPr>
+              <a:t>write()</a:t>
+            </a:r>
+            <a:r>
+              <a:rPr b="0" lang="en-US" sz="2000" spc="-1" strike="noStrike">
+                <a:solidFill>
+                  <a:srgbClr val="000000"/>
+                </a:solidFill>
+                <a:latin typeface="Arial"/>
+              </a:rPr>
+              <a:t> does not block at record boundaries, but </a:t>
+            </a:r>
+            <a:r>
+              <a:rPr b="1" lang="en-US" sz="2000" spc="-1" strike="noStrike">
+                <a:solidFill>
+                  <a:srgbClr val="000000"/>
+                </a:solidFill>
+                <a:latin typeface="Courier New"/>
+              </a:rPr>
+              <a:t>read()</a:t>
+            </a:r>
+            <a:r>
+              <a:rPr b="0" lang="en-US" sz="2000" spc="-1" strike="noStrike">
+                <a:solidFill>
+                  <a:srgbClr val="000000"/>
+                </a:solidFill>
+                <a:latin typeface="Arial"/>
+              </a:rPr>
+              <a:t> blocks until something is available </a:t>
             </a:r>
             <a:endParaRPr b="0" lang="en-US" sz="2000" spc="-1" strike="noStrike">
               <a:solidFill>
@@ -4279,8 +5078,87 @@
                 </a:solidFill>
                 <a:latin typeface="Arial"/>
               </a:rPr>
-              <a:t>Colon, forward file descriptor, comma, reverse file descriptor </a:t>
-            </a:r>
+              <a:t>Use a </a:t>
+            </a:r>
+            <a:r>
+              <a:rPr b="0" lang="en-US" sz="2000" spc="-1" strike="noStrike" u="sng">
+                <a:solidFill>
+                  <a:srgbClr val="000000"/>
+                </a:solidFill>
+                <a:uFillTx/>
+                <a:latin typeface="Arial"/>
+              </a:rPr>
+              <a:t>pair</a:t>
+            </a:r>
+            <a:r>
+              <a:rPr b="0" lang="en-US" sz="2000" spc="-1" strike="noStrike">
+                <a:solidFill>
+                  <a:srgbClr val="000000"/>
+                </a:solidFill>
+                <a:latin typeface="Arial"/>
+              </a:rPr>
+              <a:t> of POSIX pipes to simulate a Hartmann connector </a:t>
+            </a:r>
+            <a:endParaRPr b="0" lang="en-US" sz="2000" spc="-1" strike="noStrike">
+              <a:solidFill>
+                <a:srgbClr val="000000"/>
+              </a:solidFill>
+              <a:latin typeface="Arial"/>
+            </a:endParaRPr>
+          </a:p>
+          <a:p>
+            <a:pPr marL="432000" indent="-324000">
+              <a:spcAft>
+                <a:spcPts val="1054"/>
+              </a:spcAft>
+              <a:buClr>
+                <a:srgbClr val="91d93f"/>
+              </a:buClr>
+              <a:buSzPct val="45000"/>
+              <a:buFont typeface="Wingdings" charset="2"/>
+              <a:buChar char=""/>
+            </a:pPr>
+            <a:r>
+              <a:rPr b="0" lang="en-US" sz="2000" spc="-1" strike="noStrike">
+                <a:solidFill>
+                  <a:srgbClr val="000000"/>
+                </a:solidFill>
+                <a:latin typeface="Arial"/>
+              </a:rPr>
+              <a:t>Producer does a </a:t>
+            </a:r>
+            <a:r>
+              <a:rPr b="1" lang="en-US" sz="2000" spc="-1" strike="noStrike">
+                <a:solidFill>
+                  <a:srgbClr val="000000"/>
+                </a:solidFill>
+                <a:latin typeface="Courier New"/>
+              </a:rPr>
+              <a:t>read()</a:t>
+            </a:r>
+            <a:r>
+              <a:rPr b="0" lang="en-US" sz="2000" spc="-1" strike="noStrike">
+                <a:solidFill>
+                  <a:srgbClr val="000000"/>
+                </a:solidFill>
+                <a:latin typeface="Arial"/>
+              </a:rPr>
+              <a:t> on a reverse pipe until consumer says “go” then sends the record down the forward pipe and waits for “done” from consumer </a:t>
+            </a:r>
+            <a:endParaRPr b="0" lang="en-US" sz="2000" spc="-1" strike="noStrike">
+              <a:solidFill>
+                <a:srgbClr val="000000"/>
+              </a:solidFill>
+              <a:latin typeface="Arial"/>
+            </a:endParaRPr>
+          </a:p>
+          <a:p>
+            <a:pPr marL="432000" indent="0">
+              <a:spcAft>
+                <a:spcPts val="1054"/>
+              </a:spcAft>
+              <a:buNone/>
+            </a:pPr>
             <a:endParaRPr b="0" lang="en-US" sz="2000" spc="-1" strike="noStrike">
               <a:solidFill>
                 <a:srgbClr val="000000"/>
@@ -4358,7 +5236,25 @@
                 </a:solidFill>
                 <a:latin typeface="Arial"/>
               </a:rPr>
-              <a:t>Passing Connectors</a:t>
+              <a:t>Plumbing for POSIX with </a:t>
+            </a:r>
+            <a:r>
+              <a:rPr b="1" lang="en-US" sz="2700" spc="-1" strike="noStrike">
+                <a:solidFill>
+                  <a:srgbClr val="000000"/>
+                </a:solidFill>
+                <a:latin typeface="Courier New"/>
+              </a:rPr>
+              <a:t>pipe()</a:t>
+            </a:r>
+            <a:r>
+              <a:rPr b="0" lang="en-US" sz="2700" spc="-1" strike="noStrike">
+                <a:solidFill>
+                  <a:srgbClr val="000000"/>
+                </a:solidFill>
+                <a:latin typeface="Arial"/>
+              </a:rPr>
+              <a:t> pair </a:t>
             </a:r>
             <a:endParaRPr b="0" lang="en-US" sz="2700" spc="-1" strike="noStrike">
               <a:solidFill>
@@ -4410,225 +5306,105 @@
                 </a:solidFill>
                 <a:latin typeface="Arial"/>
               </a:rPr>
-              <a:t>Connector Descriptors are passed in the POSIX “environment”. </a:t>
-            </a:r>
-            <a:endParaRPr b="0" lang="en-US" sz="2000" spc="-1" strike="noStrike">
-              <a:solidFill>
-                <a:srgbClr val="000000"/>
-              </a:solidFill>
-              <a:latin typeface="Arial"/>
-            </a:endParaRPr>
-          </a:p>
-          <a:p>
-            <a:pPr indent="0">
-              <a:spcAft>
-                <a:spcPts val="1054"/>
-              </a:spcAft>
-              <a:buNone/>
-            </a:pPr>
-            <a:r>
-              <a:rPr b="0" lang="en-US" sz="2000" spc="-1" strike="noStrike">
-                <a:solidFill>
-                  <a:srgbClr val="000000"/>
-                </a:solidFill>
-                <a:latin typeface="Arial"/>
-              </a:rPr>
-              <a:t>The dispatcher sets the environment variable</a:t>
-            </a:r>
-            <a:r>
-              <a:rPr b="0" lang="en-US" sz="2000" spc="-1" strike="noStrike">
-                <a:solidFill>
-                  <a:srgbClr val="000000"/>
-                </a:solidFill>
-                <a:latin typeface="Courier New"/>
-              </a:rPr>
-              <a:t> </a:t>
-            </a:r>
-            <a:r>
-              <a:rPr b="1" lang="en-US" sz="2000" spc="-1" strike="noStrike">
-                <a:solidFill>
-                  <a:srgbClr val="000000"/>
-                </a:solidFill>
-                <a:latin typeface="Courier New"/>
-              </a:rPr>
-              <a:t>PIPECONNS</a:t>
-            </a:r>
-            <a:r>
-              <a:rPr b="0" lang="en-US" sz="2000" spc="-1" strike="noStrike">
-                <a:solidFill>
-                  <a:srgbClr val="000000"/>
-                </a:solidFill>
-                <a:latin typeface="Courier New"/>
-              </a:rPr>
-              <a:t> </a:t>
-            </a:r>
-            <a:r>
-              <a:rPr b="0" lang="en-US" sz="2000" spc="-1" strike="noStrike">
-                <a:solidFill>
-                  <a:srgbClr val="000000"/>
-                </a:solidFill>
-                <a:latin typeface="Arial"/>
-              </a:rPr>
-              <a:t>uniquely </a:t>
-            </a:r>
-            <a:br>
-              <a:rPr sz="2000"/>
-            </a:br>
-            <a:r>
-              <a:rPr b="0" lang="en-US" sz="2000" spc="-1" strike="noStrike">
-                <a:solidFill>
-                  <a:srgbClr val="000000"/>
-                </a:solidFill>
-                <a:latin typeface="Arial"/>
-              </a:rPr>
-              <a:t>for each stage as it spawns that stage. The variable contains a string of multiple connector specifications following the syntax shown: </a:t>
-            </a:r>
-            <a:endParaRPr b="0" lang="en-US" sz="2000" spc="-1" strike="noStrike">
-              <a:solidFill>
-                <a:srgbClr val="000000"/>
-              </a:solidFill>
-              <a:latin typeface="Arial"/>
-            </a:endParaRPr>
-          </a:p>
-          <a:p>
-            <a:pPr indent="0">
-              <a:spcAft>
-                <a:spcPts val="1054"/>
-              </a:spcAft>
-              <a:buNone/>
-            </a:pPr>
-            <a:endParaRPr b="0" lang="en-US" sz="2000" spc="-1" strike="noStrike">
-              <a:solidFill>
-                <a:srgbClr val="000000"/>
-              </a:solidFill>
-              <a:latin typeface="Arial"/>
-            </a:endParaRPr>
-          </a:p>
-          <a:p>
-            <a:pPr indent="0" algn="ctr">
-              <a:spcAft>
-                <a:spcPts val="1054"/>
-              </a:spcAft>
-              <a:buNone/>
-            </a:pPr>
-            <a:r>
-              <a:rPr b="1" lang="en-US" sz="2000" spc="-1" strike="noStrike">
-                <a:solidFill>
-                  <a:srgbClr val="000000"/>
-                </a:solidFill>
-                <a:latin typeface="Courier New"/>
-              </a:rPr>
-              <a:t>*.</a:t>
-            </a:r>
-            <a:r>
-              <a:rPr b="0" lang="en-US" sz="2000" spc="-1" strike="noStrike">
-                <a:solidFill>
-                  <a:srgbClr val="000000"/>
-                </a:solidFill>
-                <a:latin typeface="Arial"/>
-              </a:rPr>
-              <a:t> [input|output] </a:t>
-            </a:r>
-            <a:r>
-              <a:rPr b="1" lang="en-US" sz="2000" spc="-1" strike="noStrike">
-                <a:solidFill>
-                  <a:srgbClr val="000000"/>
-                </a:solidFill>
-                <a:latin typeface="Courier New"/>
-              </a:rPr>
-              <a:t>.</a:t>
-            </a:r>
-            <a:r>
-              <a:rPr b="0" lang="en-US" sz="2000" spc="-1" strike="noStrike">
-                <a:solidFill>
-                  <a:srgbClr val="000000"/>
-                </a:solidFill>
-                <a:latin typeface="Arial"/>
-              </a:rPr>
-              <a:t> [name|number] </a:t>
-            </a:r>
-            <a:r>
-              <a:rPr b="1" lang="en-US" sz="2000" spc="-1" strike="noStrike">
-                <a:solidFill>
-                  <a:srgbClr val="000000"/>
-                </a:solidFill>
-                <a:latin typeface="Courier New"/>
-              </a:rPr>
-              <a:t>:</a:t>
-            </a:r>
-            <a:r>
-              <a:rPr b="0" lang="en-US" sz="2000" spc="-1" strike="noStrike">
-                <a:solidFill>
-                  <a:srgbClr val="000000"/>
-                </a:solidFill>
-                <a:latin typeface="Arial"/>
-              </a:rPr>
-              <a:t> fdfwd </a:t>
-            </a:r>
-            <a:r>
-              <a:rPr b="1" lang="en-US" sz="2000" spc="-1" strike="noStrike">
-                <a:solidFill>
-                  <a:srgbClr val="000000"/>
-                </a:solidFill>
-                <a:latin typeface="Courier New"/>
-              </a:rPr>
-              <a:t>,</a:t>
-            </a:r>
-            <a:r>
-              <a:rPr b="0" lang="en-US" sz="2000" spc="-1" strike="noStrike">
-                <a:solidFill>
-                  <a:srgbClr val="000000"/>
-                </a:solidFill>
-                <a:latin typeface="Arial"/>
-              </a:rPr>
-              <a:t> fdrev</a:t>
-            </a:r>
-            <a:endParaRPr b="0" lang="en-US" sz="2000" spc="-1" strike="noStrike">
-              <a:solidFill>
-                <a:srgbClr val="000000"/>
-              </a:solidFill>
-              <a:latin typeface="Arial"/>
-            </a:endParaRPr>
-          </a:p>
-          <a:p>
-            <a:pPr indent="0">
-              <a:spcAft>
-                <a:spcPts val="1054"/>
-              </a:spcAft>
-              <a:buNone/>
-            </a:pPr>
-            <a:endParaRPr b="0" lang="en-US" sz="2000" spc="-1" strike="noStrike">
-              <a:solidFill>
-                <a:srgbClr val="000000"/>
-              </a:solidFill>
-              <a:latin typeface="Arial"/>
-            </a:endParaRPr>
-          </a:p>
-          <a:p>
-            <a:pPr indent="0">
-              <a:spcAft>
-                <a:spcPts val="1054"/>
-              </a:spcAft>
-              <a:buNone/>
-            </a:pPr>
-            <a:r>
-              <a:rPr b="0" lang="en-US" sz="2000" spc="-1" strike="noStrike">
-                <a:solidFill>
-                  <a:srgbClr val="000000"/>
-                </a:solidFill>
-                <a:latin typeface="Arial"/>
-              </a:rPr>
-              <a:t>File descriptors opened by the dispatcher and inherited by the stages </a:t>
-            </a:r>
-            <a:endParaRPr b="0" lang="en-US" sz="2000" spc="-1" strike="noStrike">
-              <a:solidFill>
-                <a:srgbClr val="000000"/>
-              </a:solidFill>
-              <a:latin typeface="Arial"/>
-            </a:endParaRPr>
-          </a:p>
-          <a:p>
-            <a:pPr indent="0">
+              <a:t>POSIX plumbing is slow. </a:t>
+            </a:r>
+            <a:endParaRPr b="0" lang="en-US" sz="2000" spc="-1" strike="noStrike">
+              <a:solidFill>
+                <a:srgbClr val="000000"/>
+              </a:solidFill>
+              <a:latin typeface="Arial"/>
+            </a:endParaRPr>
+          </a:p>
+          <a:p>
+            <a:pPr indent="0">
+              <a:spcAft>
+                <a:spcPts val="1054"/>
+              </a:spcAft>
+              <a:buNone/>
+            </a:pPr>
+            <a:r>
+              <a:rPr b="0" lang="en-US" sz="2000" spc="-1" strike="noStrike">
+                <a:solidFill>
+                  <a:srgbClr val="000000"/>
+                </a:solidFill>
+                <a:latin typeface="Arial"/>
+              </a:rPr>
+              <a:t>Start with that because it is known to work. </a:t>
+            </a:r>
+            <a:endParaRPr b="0" lang="en-US" sz="2000" spc="-1" strike="noStrike">
+              <a:solidFill>
+                <a:srgbClr val="000000"/>
+              </a:solidFill>
+              <a:latin typeface="Arial"/>
+            </a:endParaRPr>
+          </a:p>
+          <a:p>
+            <a:pPr indent="0">
+              <a:spcAft>
+                <a:spcPts val="1054"/>
+              </a:spcAft>
+              <a:buNone/>
+            </a:pPr>
+            <a:r>
+              <a:rPr b="0" lang="en-US" sz="2000" spc="-1" strike="noStrike">
+                <a:solidFill>
+                  <a:srgbClr val="000000"/>
+                </a:solidFill>
+                <a:latin typeface="Arial"/>
+              </a:rPr>
+              <a:t>Switch to using shared memory when/where that is available. </a:t>
+            </a:r>
+            <a:endParaRPr b="0" lang="en-US" sz="2000" spc="-1" strike="noStrike">
+              <a:solidFill>
+                <a:srgbClr val="000000"/>
+              </a:solidFill>
+              <a:latin typeface="Arial"/>
+            </a:endParaRPr>
+          </a:p>
+          <a:p>
+            <a:pPr indent="0">
+              <a:spcAft>
+                <a:spcPts val="1054"/>
+              </a:spcAft>
+              <a:buNone/>
+            </a:pPr>
+            <a:endParaRPr b="0" lang="en-US" sz="2000" spc="-1" strike="noStrike">
+              <a:solidFill>
+                <a:srgbClr val="000000"/>
+              </a:solidFill>
+              <a:latin typeface="Arial"/>
+            </a:endParaRPr>
+          </a:p>
+          <a:p>
+            <a:pPr marL="432000" indent="0">
+              <a:spcAft>
+                <a:spcPts val="1054"/>
+              </a:spcAft>
+              <a:buNone/>
+            </a:pPr>
+            <a:endParaRPr b="0" lang="en-US" sz="2000" spc="-1" strike="noStrike">
+              <a:solidFill>
+                <a:srgbClr val="000000"/>
+              </a:solidFill>
+              <a:latin typeface="Arial"/>
+            </a:endParaRPr>
+          </a:p>
+          <a:p>
+            <a:pPr marL="432000" indent="0">
+              <a:spcAft>
+                <a:spcPts val="1054"/>
+              </a:spcAft>
+              <a:buNone/>
+            </a:pPr>
+            <a:endParaRPr b="0" lang="en-US" sz="2000" spc="-1" strike="noStrike">
+              <a:solidFill>
+                <a:srgbClr val="000000"/>
+              </a:solidFill>
+              <a:latin typeface="Arial"/>
+            </a:endParaRPr>
+          </a:p>
+          <a:p>
+            <a:pPr marL="432000" indent="0">
               <a:spcAft>
                 <a:spcPts val="1054"/>
               </a:spcAft>
@@ -4711,7 +5487,7 @@
                 </a:solidFill>
                 <a:latin typeface="Arial"/>
               </a:rPr>
-              <a:t>Flow Protocol – sending a record</a:t>
+              <a:t>POSIX Plumbing Program</a:t>
             </a:r>
             <a:endParaRPr b="0" lang="en-US" sz="2700" spc="-1" strike="noStrike">
               <a:solidFill>
@@ -4734,8 +5510,8 @@
         </p:nvSpPr>
         <p:spPr>
           <a:xfrm>
-            <a:off x="685800" y="1371600"/>
-            <a:ext cx="2514600" cy="3599640"/>
+            <a:off x="539640" y="1349640"/>
+            <a:ext cx="8997120" cy="3599640"/>
           </a:xfrm>
           <a:prstGeom prst="rect">
             <a:avLst/>
@@ -4750,237 +5526,99 @@
             <a:normAutofit/>
           </a:bodyPr>
           <a:p>
-            <a:pPr indent="0">
-              <a:spcAft>
-                <a:spcPts val="1054"/>
-              </a:spcAft>
-              <a:buNone/>
-            </a:pPr>
-            <a:endParaRPr b="0" lang="en-US" sz="2000" spc="-1" strike="noStrike">
-              <a:solidFill>
-                <a:srgbClr val="000000"/>
-              </a:solidFill>
-              <a:latin typeface="Arial"/>
-            </a:endParaRPr>
-          </a:p>
-          <a:p>
-            <a:pPr indent="0">
-              <a:spcAft>
-                <a:spcPts val="1054"/>
-              </a:spcAft>
-              <a:buNone/>
-            </a:pPr>
-            <a:r>
-              <a:rPr b="0" lang="en-US" sz="2000" spc="-1" strike="noStrike">
-                <a:solidFill>
-                  <a:srgbClr val="000000"/>
-                </a:solidFill>
-                <a:latin typeface="Arial"/>
-              </a:rPr>
-              <a:t>Producer has 1234 bytes to send, calls an ‘</a:t>
-            </a:r>
-            <a:r>
-              <a:rPr b="0" lang="en-US" sz="2000" spc="-1" strike="noStrike">
+            <a:pPr marL="432000" indent="-324000">
+              <a:spcAft>
+                <a:spcPts val="1054"/>
+              </a:spcAft>
+              <a:buClr>
+                <a:srgbClr val="91d93f"/>
+              </a:buClr>
+              <a:buSzPct val="45000"/>
+              <a:buFont typeface="Wingdings" charset="2"/>
+              <a:buChar char=""/>
+            </a:pPr>
+            <a:r>
+              <a:rPr b="0" lang="en-US" sz="2000" spc="-1" strike="noStrike">
+                <a:solidFill>
+                  <a:srgbClr val="000000"/>
+                </a:solidFill>
+                <a:latin typeface="Arial"/>
+              </a:rPr>
+              <a:t>‘</a:t>
+            </a:r>
+            <a:r>
+              <a:rPr b="1" lang="en-US" sz="2000" spc="-1" strike="noStrike">
                 <a:solidFill>
                   <a:srgbClr val="000000"/>
                 </a:solidFill>
                 <a:latin typeface="Courier New"/>
               </a:rPr>
-              <a:t>OUTPUT</a:t>
-            </a:r>
-            <a:r>
-              <a:rPr b="0" lang="en-US" sz="2000" spc="-1" strike="noStrike">
-                <a:solidFill>
-                  <a:srgbClr val="000000"/>
-                </a:solidFill>
-                <a:latin typeface="Arial"/>
-              </a:rPr>
-              <a:t>’, passes metadata and blocks</a:t>
-            </a:r>
-            <a:endParaRPr b="0" lang="en-US" sz="2000" spc="-1" strike="noStrike">
-              <a:solidFill>
-                <a:srgbClr val="000000"/>
-              </a:solidFill>
-              <a:latin typeface="Arial"/>
-            </a:endParaRPr>
-          </a:p>
-          <a:p>
-            <a:pPr indent="0">
-              <a:spcAft>
-                <a:spcPts val="1054"/>
-              </a:spcAft>
-              <a:buNone/>
-            </a:pPr>
-            <a:endParaRPr b="0" lang="en-US" sz="2000" spc="-1" strike="noStrike">
-              <a:solidFill>
-                <a:srgbClr val="000000"/>
-              </a:solidFill>
-              <a:latin typeface="Arial"/>
-            </a:endParaRPr>
-          </a:p>
-          <a:p>
-            <a:pPr indent="0">
-              <a:spcAft>
-                <a:spcPts val="1054"/>
-              </a:spcAft>
-              <a:buNone/>
-            </a:pPr>
-            <a:r>
-              <a:rPr b="0" lang="en-US" sz="2000" spc="-1" strike="noStrike">
-                <a:solidFill>
-                  <a:srgbClr val="000000"/>
-                </a:solidFill>
-                <a:latin typeface="Arial"/>
-              </a:rPr>
-              <a:t>After consumer returns “</a:t>
-            </a:r>
-            <a:r>
-              <a:rPr b="0" lang="en-US" sz="2000" spc="-1" strike="noStrike">
-                <a:solidFill>
-                  <a:srgbClr val="000000"/>
-                </a:solidFill>
-                <a:latin typeface="Courier New"/>
-              </a:rPr>
-              <a:t>NEXT</a:t>
-            </a:r>
-            <a:r>
-              <a:rPr b="0" lang="en-US" sz="2000" spc="-1" strike="noStrike">
-                <a:solidFill>
-                  <a:srgbClr val="000000"/>
-                </a:solidFill>
-                <a:latin typeface="Arial"/>
-              </a:rPr>
-              <a:t>”, producer sends “</a:t>
-            </a:r>
-            <a:r>
-              <a:rPr b="0" lang="en-US" sz="2000" spc="-1" strike="noStrike">
-                <a:solidFill>
-                  <a:srgbClr val="000000"/>
-                </a:solidFill>
-                <a:latin typeface="Courier New"/>
-              </a:rPr>
-              <a:t>OKAY</a:t>
-            </a:r>
-            <a:r>
-              <a:rPr b="0" lang="en-US" sz="2000" spc="-1" strike="noStrike">
-                <a:solidFill>
-                  <a:srgbClr val="000000"/>
-                </a:solidFill>
-                <a:latin typeface="Arial"/>
-              </a:rPr>
-              <a:t>” and unblocks</a:t>
-            </a:r>
-            <a:endParaRPr b="0" lang="en-US" sz="2000" spc="-1" strike="noStrike">
-              <a:solidFill>
-                <a:srgbClr val="000000"/>
-              </a:solidFill>
-              <a:latin typeface="Arial"/>
-            </a:endParaRPr>
-          </a:p>
-          <a:p>
-            <a:pPr indent="0">
-              <a:spcAft>
-                <a:spcPts val="1054"/>
-              </a:spcAft>
-              <a:buNone/>
-            </a:pPr>
-            <a:endParaRPr b="0" lang="en-US" sz="2000" spc="-1" strike="noStrike">
-              <a:solidFill>
-                <a:srgbClr val="000000"/>
-              </a:solidFill>
-              <a:latin typeface="Arial"/>
-            </a:endParaRPr>
-          </a:p>
-          <a:p>
-            <a:pPr indent="0">
-              <a:spcAft>
-                <a:spcPts val="1054"/>
-              </a:spcAft>
-              <a:buNone/>
-            </a:pPr>
-            <a:endParaRPr b="0" lang="en-US" sz="2000" spc="-1" strike="noStrike">
-              <a:solidFill>
-                <a:srgbClr val="000000"/>
-              </a:solidFill>
-              <a:latin typeface="Arial"/>
-            </a:endParaRPr>
-          </a:p>
-        </p:txBody>
-      </p:sp>
-      <p:sp>
-        <p:nvSpPr>
-          <p:cNvPr id="58" name="PlaceHolder 3"/>
-          <p:cNvSpPr>
-            <a:spLocks noGrp="1"/>
-          </p:cNvSpPr>
-          <p:nvPr>
-            <p:ph/>
-          </p:nvPr>
-        </p:nvSpPr>
-        <p:spPr>
-          <a:xfrm>
-            <a:off x="6858000" y="1350000"/>
-            <a:ext cx="2514600" cy="3599640"/>
-          </a:xfrm>
-          <a:prstGeom prst="rect">
-            <a:avLst/>
-          </a:prstGeom>
-          <a:noFill/>
-          <a:ln w="0">
-            <a:noFill/>
-          </a:ln>
-        </p:spPr>
-        <p:txBody>
-          <a:bodyPr lIns="0" rIns="0" tIns="0" bIns="0" anchor="t">
-            <a:normAutofit/>
-          </a:bodyPr>
-          <a:p>
-            <a:pPr indent="0" algn="r">
-              <a:spcAft>
-                <a:spcPts val="1054"/>
-              </a:spcAft>
-              <a:buNone/>
-            </a:pPr>
-            <a:endParaRPr b="0" lang="en-US" sz="2000" spc="-1" strike="noStrike">
-              <a:solidFill>
-                <a:srgbClr val="000000"/>
-              </a:solidFill>
-              <a:latin typeface="Arial"/>
-            </a:endParaRPr>
-          </a:p>
-          <a:p>
-            <a:pPr indent="0" algn="r">
-              <a:spcAft>
-                <a:spcPts val="1054"/>
-              </a:spcAft>
-              <a:buNone/>
-            </a:pPr>
-            <a:r>
-              <a:rPr b="0" lang="en-US" sz="2000" spc="-1" strike="noStrike">
-                <a:solidFill>
-                  <a:srgbClr val="000000"/>
-                </a:solidFill>
-                <a:latin typeface="Arial"/>
-              </a:rPr>
-              <a:t>Consumer issues a ‘</a:t>
-            </a:r>
-            <a:r>
-              <a:rPr b="0" lang="en-US" sz="2000" spc="-1" strike="noStrike">
-                <a:solidFill>
-                  <a:srgbClr val="000000"/>
-                </a:solidFill>
-                <a:latin typeface="Courier New"/>
-              </a:rPr>
-              <a:t>READTO</a:t>
-            </a:r>
-            <a:r>
-              <a:rPr b="0" lang="en-US" sz="2000" spc="-1" strike="noStrike">
-                <a:solidFill>
-                  <a:srgbClr val="000000"/>
-                </a:solidFill>
-                <a:latin typeface="Arial"/>
-              </a:rPr>
-              <a:t>’ and drives the transaction.</a:t>
+              <a:t>pipe</a:t>
+            </a:r>
+            <a:r>
+              <a:rPr b="0" lang="en-US" sz="2000" spc="-1" strike="noStrike">
+                <a:solidFill>
+                  <a:srgbClr val="000000"/>
+                </a:solidFill>
+                <a:latin typeface="Arial"/>
+              </a:rPr>
+              <a:t>’ command from any shell </a:t>
+            </a:r>
+            <a:endParaRPr b="0" lang="en-US" sz="2000" spc="-1" strike="noStrike">
+              <a:solidFill>
+                <a:srgbClr val="000000"/>
+              </a:solidFill>
+              <a:latin typeface="Arial"/>
+            </a:endParaRPr>
+          </a:p>
+          <a:p>
+            <a:pPr marL="432000" indent="-324000">
+              <a:spcAft>
+                <a:spcPts val="1054"/>
+              </a:spcAft>
+              <a:buClr>
+                <a:srgbClr val="91d93f"/>
+              </a:buClr>
+              <a:buSzPct val="45000"/>
+              <a:buFont typeface="Wingdings" charset="2"/>
+              <a:buChar char=""/>
+            </a:pPr>
+            <a:r>
+              <a:rPr b="0" lang="en-US" sz="2000" spc="-1" strike="noStrike">
+                <a:solidFill>
+                  <a:srgbClr val="000000"/>
+                </a:solidFill>
+                <a:latin typeface="Arial"/>
+              </a:rPr>
+              <a:t>Follows CMS/TSO Pipelines syntax but also does Unix style </a:t>
+            </a:r>
+            <a:endParaRPr b="0" lang="en-US" sz="2000" spc="-1" strike="noStrike">
+              <a:solidFill>
+                <a:srgbClr val="000000"/>
+              </a:solidFill>
+              <a:latin typeface="Arial"/>
+            </a:endParaRPr>
+          </a:p>
+          <a:p>
+            <a:pPr marL="432000" indent="-324000">
+              <a:spcAft>
+                <a:spcPts val="1054"/>
+              </a:spcAft>
+              <a:buClr>
+                <a:srgbClr val="91d93f"/>
+              </a:buClr>
+              <a:buSzPct val="45000"/>
+              <a:buFont typeface="Wingdings" charset="2"/>
+              <a:buChar char=""/>
+            </a:pPr>
+            <a:r>
+              <a:rPr b="0" lang="en-US" sz="2000" spc="-1" strike="noStrike">
+                <a:solidFill>
+                  <a:srgbClr val="000000"/>
+                </a:solidFill>
+                <a:latin typeface="Arial"/>
+              </a:rPr>
+              <a:t>Parser splits the (quoted*) pipeline into stages </a:t>
             </a:r>
             <a:br>
               <a:rPr sz="2000"/>
@@ -4992,379 +5630,166 @@
                 </a:solidFill>
                 <a:latin typeface="Arial"/>
               </a:rPr>
-              <a:t> It confirms that its buffer can hold the record coming, returns “</a:t>
-            </a:r>
-            <a:r>
-              <a:rPr b="0" lang="en-US" sz="2000" spc="-1" strike="noStrike">
+              <a:t>*so that the shell doesn’t get involved </a:t>
+            </a:r>
+            <a:endParaRPr b="0" lang="en-US" sz="2000" spc="-1" strike="noStrike">
+              <a:solidFill>
+                <a:srgbClr val="000000"/>
+              </a:solidFill>
+              <a:latin typeface="Arial"/>
+            </a:endParaRPr>
+          </a:p>
+          <a:p>
+            <a:pPr marL="432000" indent="-324000">
+              <a:spcAft>
+                <a:spcPts val="1054"/>
+              </a:spcAft>
+              <a:buClr>
+                <a:srgbClr val="91d93f"/>
+              </a:buClr>
+              <a:buSzPct val="45000"/>
+              <a:buFont typeface="Wingdings" charset="2"/>
+              <a:buChar char=""/>
+            </a:pPr>
+            <a:r>
+              <a:rPr b="0" lang="en-US" sz="2000" spc="-1" strike="noStrike">
+                <a:solidFill>
+                  <a:srgbClr val="000000"/>
+                </a:solidFill>
+                <a:latin typeface="Arial"/>
+              </a:rPr>
+              <a:t>Dispatcher arranges file descriptors for individual stages then spawns them </a:t>
+            </a:r>
+            <a:endParaRPr b="0" lang="en-US" sz="2000" spc="-1" strike="noStrike">
+              <a:solidFill>
+                <a:srgbClr val="000000"/>
+              </a:solidFill>
+              <a:latin typeface="Arial"/>
+            </a:endParaRPr>
+          </a:p>
+          <a:p>
+            <a:pPr marL="432000" indent="-324000">
+              <a:spcAft>
+                <a:spcPts val="1054"/>
+              </a:spcAft>
+              <a:buClr>
+                <a:srgbClr val="91d93f"/>
+              </a:buClr>
+              <a:buSzPct val="45000"/>
+              <a:buFont typeface="Wingdings" charset="2"/>
+              <a:buChar char=""/>
+            </a:pPr>
+            <a:r>
+              <a:rPr b="0" lang="en-US" sz="2000" spc="-1" strike="noStrike">
+                <a:solidFill>
+                  <a:srgbClr val="000000"/>
+                </a:solidFill>
+                <a:latin typeface="Arial"/>
+              </a:rPr>
+              <a:t>Stages inherit open file descriptors and env vars describing them </a:t>
+            </a:r>
+            <a:endParaRPr b="0" lang="en-US" sz="2000" spc="-1" strike="noStrike">
+              <a:solidFill>
+                <a:srgbClr val="000000"/>
+              </a:solidFill>
+              <a:latin typeface="Arial"/>
+            </a:endParaRPr>
+          </a:p>
+          <a:p>
+            <a:pPr marL="432000" indent="-324000">
+              <a:spcAft>
+                <a:spcPts val="1054"/>
+              </a:spcAft>
+              <a:buClr>
+                <a:srgbClr val="91d93f"/>
+              </a:buClr>
+              <a:buSzPct val="45000"/>
+              <a:buFont typeface="Wingdings" charset="2"/>
+              <a:buChar char=""/>
+            </a:pPr>
+            <a:r>
+              <a:rPr b="0" lang="en-US" sz="2000" spc="-1" strike="noStrike">
+                <a:solidFill>
+                  <a:srgbClr val="000000"/>
+                </a:solidFill>
+                <a:latin typeface="Arial"/>
+              </a:rPr>
+              <a:t>Stages are programs but </a:t>
+            </a:r>
+            <a:r>
+              <a:rPr b="0" lang="en-US" sz="2000" spc="-1" strike="noStrike" u="sng">
+                <a:solidFill>
+                  <a:srgbClr val="000000"/>
+                </a:solidFill>
+                <a:uFillTx/>
+                <a:latin typeface="Arial"/>
+              </a:rPr>
+              <a:t>not</a:t>
+            </a:r>
+            <a:r>
+              <a:rPr b="0" lang="en-US" sz="2000" spc="-1" strike="noStrike">
+                <a:solidFill>
+                  <a:srgbClr val="000000"/>
+                </a:solidFill>
+                <a:latin typeface="Arial"/>
+              </a:rPr>
+              <a:t> found via </a:t>
+            </a:r>
+            <a:r>
+              <a:rPr b="1" lang="en-US" sz="2000" spc="-1" strike="noStrike">
                 <a:solidFill>
                   <a:srgbClr val="000000"/>
                 </a:solidFill>
                 <a:latin typeface="Courier New"/>
               </a:rPr>
-              <a:t>PEEK</a:t>
-            </a:r>
-            <a:r>
-              <a:rPr b="0" lang="en-US" sz="2000" spc="-1" strike="noStrike">
-                <a:solidFill>
-                  <a:srgbClr val="000000"/>
-                </a:solidFill>
-                <a:latin typeface="Arial"/>
-              </a:rPr>
-              <a:t>” and reads, returns “</a:t>
-            </a:r>
-            <a:r>
-              <a:rPr b="0" lang="en-US" sz="2000" spc="-1" strike="noStrike">
-                <a:solidFill>
-                  <a:srgbClr val="000000"/>
-                </a:solidFill>
-                <a:latin typeface="Courier New"/>
-              </a:rPr>
-              <a:t>NEXT</a:t>
-            </a:r>
-            <a:r>
-              <a:rPr b="0" lang="en-US" sz="2000" spc="-1" strike="noStrike">
-                <a:solidFill>
-                  <a:srgbClr val="000000"/>
-                </a:solidFill>
-                <a:latin typeface="Arial"/>
-              </a:rPr>
-              <a:t>”, then unblocks</a:t>
-            </a:r>
-            <a:endParaRPr b="0" lang="en-US" sz="2000" spc="-1" strike="noStrike">
-              <a:solidFill>
-                <a:srgbClr val="000000"/>
-              </a:solidFill>
-              <a:latin typeface="Arial"/>
-            </a:endParaRPr>
-          </a:p>
-          <a:p>
-            <a:pPr indent="0" algn="r">
-              <a:spcAft>
-                <a:spcPts val="1054"/>
-              </a:spcAft>
-              <a:buNone/>
-            </a:pPr>
-            <a:endParaRPr b="0" lang="en-US" sz="2000" spc="-1" strike="noStrike">
-              <a:solidFill>
-                <a:srgbClr val="000000"/>
-              </a:solidFill>
-              <a:latin typeface="Arial"/>
-            </a:endParaRPr>
-          </a:p>
-        </p:txBody>
-      </p:sp>
-      <p:sp>
-        <p:nvSpPr>
-          <p:cNvPr id="59" name="PlaceHolder 4"/>
-          <p:cNvSpPr>
-            <a:spLocks noGrp="1"/>
-          </p:cNvSpPr>
-          <p:nvPr>
-            <p:ph/>
-          </p:nvPr>
-        </p:nvSpPr>
-        <p:spPr>
-          <a:xfrm>
-            <a:off x="3429000" y="1350000"/>
-            <a:ext cx="3200400" cy="3599640"/>
-          </a:xfrm>
-          <a:prstGeom prst="rect">
-            <a:avLst/>
-          </a:prstGeom>
-          <a:noFill/>
-          <a:ln w="0">
-            <a:noFill/>
-          </a:ln>
-        </p:spPr>
-        <p:txBody>
-          <a:bodyPr lIns="0" rIns="0" tIns="0" bIns="0" anchor="t">
-            <a:normAutofit/>
-          </a:bodyPr>
-          <a:p>
-            <a:pPr indent="0">
-              <a:spcAft>
-                <a:spcPts val="1054"/>
-              </a:spcAft>
-              <a:buNone/>
-            </a:pPr>
-            <a:r>
-              <a:rPr b="0" lang="en-US" sz="2000" spc="-1" strike="noStrike">
-                <a:solidFill>
-                  <a:srgbClr val="000000"/>
-                </a:solidFill>
-                <a:latin typeface="Arial"/>
-              </a:rPr>
-              <a:t>fdforward               fdreverse</a:t>
-            </a:r>
-            <a:endParaRPr b="0" lang="en-US" sz="2000" spc="-1" strike="noStrike">
-              <a:solidFill>
-                <a:srgbClr val="000000"/>
-              </a:solidFill>
-              <a:latin typeface="Arial"/>
-            </a:endParaRPr>
-          </a:p>
-          <a:p>
-            <a:pPr indent="0" algn="r">
-              <a:spcAft>
-                <a:spcPts val="1054"/>
-              </a:spcAft>
-              <a:buNone/>
-            </a:pPr>
-            <a:r>
-              <a:rPr b="0" lang="en-US" sz="2000" spc="-1" strike="noStrike">
-                <a:solidFill>
-                  <a:srgbClr val="000000"/>
-                </a:solidFill>
-                <a:latin typeface="Arial"/>
-              </a:rPr>
-              <a:t> ←   “</a:t>
-            </a:r>
-            <a:r>
-              <a:rPr b="1" lang="en-US" sz="2000" spc="-1" strike="noStrike">
-                <a:solidFill>
-                  <a:srgbClr val="000000"/>
-                </a:solidFill>
-                <a:latin typeface="Courier New"/>
-              </a:rPr>
-              <a:t>STAT</a:t>
-            </a:r>
-            <a:r>
-              <a:rPr b="0" lang="en-US" sz="2000" spc="-1" strike="noStrike">
-                <a:solidFill>
-                  <a:srgbClr val="000000"/>
-                </a:solidFill>
-                <a:latin typeface="Arial"/>
-              </a:rPr>
-              <a:t>”</a:t>
-            </a:r>
-            <a:endParaRPr b="0" lang="en-US" sz="2000" spc="-1" strike="noStrike">
-              <a:solidFill>
-                <a:srgbClr val="000000"/>
-              </a:solidFill>
-              <a:latin typeface="Arial"/>
-            </a:endParaRPr>
-          </a:p>
-          <a:p>
-            <a:pPr indent="0">
-              <a:spcAft>
-                <a:spcPts val="1054"/>
-              </a:spcAft>
-              <a:buNone/>
-            </a:pPr>
-            <a:r>
-              <a:rPr b="0" lang="en-US" sz="2000" spc="-1" strike="noStrike">
-                <a:solidFill>
-                  <a:srgbClr val="000000"/>
-                </a:solidFill>
-                <a:latin typeface="Arial"/>
-              </a:rPr>
-              <a:t>“</a:t>
-            </a:r>
-            <a:r>
-              <a:rPr b="1" lang="en-US" sz="2000" spc="-1" strike="noStrike">
-                <a:solidFill>
-                  <a:srgbClr val="000000"/>
-                </a:solidFill>
-                <a:latin typeface="Courier New"/>
-              </a:rPr>
-              <a:t>DATA 1234</a:t>
-            </a:r>
-            <a:r>
-              <a:rPr b="0" lang="en-US" sz="2000" spc="-1" strike="noStrike">
-                <a:solidFill>
-                  <a:srgbClr val="000000"/>
-                </a:solidFill>
-                <a:latin typeface="Arial"/>
-              </a:rPr>
-              <a:t>”   → </a:t>
-            </a:r>
-            <a:endParaRPr b="0" lang="en-US" sz="2000" spc="-1" strike="noStrike">
-              <a:solidFill>
-                <a:srgbClr val="000000"/>
-              </a:solidFill>
-              <a:latin typeface="Arial"/>
-            </a:endParaRPr>
-          </a:p>
-          <a:p>
-            <a:pPr indent="0" algn="r">
-              <a:spcAft>
-                <a:spcPts val="1054"/>
-              </a:spcAft>
-              <a:buNone/>
-            </a:pPr>
-            <a:r>
-              <a:rPr b="0" lang="en-US" sz="2000" spc="-1" strike="noStrike">
-                <a:solidFill>
-                  <a:srgbClr val="000000"/>
-                </a:solidFill>
-                <a:latin typeface="Arial"/>
-              </a:rPr>
-              <a:t> ←   “</a:t>
-            </a:r>
-            <a:r>
-              <a:rPr b="1" lang="en-US" sz="2000" spc="-1" strike="noStrike">
-                <a:solidFill>
-                  <a:srgbClr val="000000"/>
-                </a:solidFill>
-                <a:latin typeface="Courier New"/>
-              </a:rPr>
-              <a:t>PEEK 1234</a:t>
-            </a:r>
-            <a:r>
-              <a:rPr b="0" lang="en-US" sz="2000" spc="-1" strike="noStrike">
-                <a:solidFill>
-                  <a:srgbClr val="000000"/>
-                </a:solidFill>
-                <a:latin typeface="Arial"/>
-              </a:rPr>
-              <a:t>”</a:t>
-            </a:r>
-            <a:endParaRPr b="0" lang="en-US" sz="2000" spc="-1" strike="noStrike">
-              <a:solidFill>
-                <a:srgbClr val="000000"/>
-              </a:solidFill>
-              <a:latin typeface="Arial"/>
-            </a:endParaRPr>
-          </a:p>
-          <a:p>
-            <a:pPr indent="0">
-              <a:spcAft>
-                <a:spcPts val="1054"/>
-              </a:spcAft>
-              <a:buNone/>
-            </a:pPr>
-            <a:r>
-              <a:rPr b="0" i="1" lang="en-US" sz="2000" spc="-1" strike="noStrike">
-                <a:solidFill>
-                  <a:srgbClr val="000000"/>
-                </a:solidFill>
-                <a:latin typeface="Arial"/>
-              </a:rPr>
-              <a:t>1234 bytes of data</a:t>
-            </a:r>
-            <a:r>
-              <a:rPr b="0" i="1" lang="en-US" sz="2000" spc="-1" strike="noStrike">
-                <a:solidFill>
-                  <a:srgbClr val="000000"/>
-                </a:solidFill>
-                <a:latin typeface="Arial"/>
-              </a:rPr>
-              <a:t>   → </a:t>
-            </a:r>
-            <a:endParaRPr b="0" lang="en-US" sz="2000" spc="-1" strike="noStrike">
-              <a:solidFill>
-                <a:srgbClr val="000000"/>
-              </a:solidFill>
-              <a:latin typeface="Arial"/>
-            </a:endParaRPr>
-          </a:p>
-          <a:p>
-            <a:pPr indent="0" algn="r">
-              <a:spcAft>
-                <a:spcPts val="1054"/>
-              </a:spcAft>
-              <a:buNone/>
-            </a:pPr>
-            <a:r>
-              <a:rPr b="0" lang="en-US" sz="2000" spc="-1" strike="noStrike">
-                <a:solidFill>
-                  <a:srgbClr val="000000"/>
-                </a:solidFill>
-                <a:latin typeface="Arial"/>
-              </a:rPr>
-              <a:t> ←   “</a:t>
-            </a:r>
-            <a:r>
-              <a:rPr b="1" lang="en-US" sz="2000" spc="-1" strike="noStrike">
-                <a:solidFill>
-                  <a:srgbClr val="000000"/>
-                </a:solidFill>
-                <a:latin typeface="Courier New"/>
-              </a:rPr>
-              <a:t>NEXT</a:t>
-            </a:r>
-            <a:r>
-              <a:rPr b="0" lang="en-US" sz="2000" spc="-1" strike="noStrike">
-                <a:solidFill>
-                  <a:srgbClr val="000000"/>
-                </a:solidFill>
-                <a:latin typeface="Arial"/>
-              </a:rPr>
-              <a:t>”</a:t>
-            </a:r>
-            <a:endParaRPr b="0" lang="en-US" sz="2000" spc="-1" strike="noStrike">
-              <a:solidFill>
-                <a:srgbClr val="000000"/>
-              </a:solidFill>
-              <a:latin typeface="Arial"/>
-            </a:endParaRPr>
-          </a:p>
-          <a:p>
-            <a:pPr indent="0">
-              <a:spcAft>
-                <a:spcPts val="1054"/>
-              </a:spcAft>
-              <a:buNone/>
-            </a:pPr>
-            <a:r>
-              <a:rPr b="0" lang="en-US" sz="2000" spc="-1" strike="noStrike">
-                <a:solidFill>
-                  <a:srgbClr val="000000"/>
-                </a:solidFill>
-                <a:latin typeface="Arial"/>
-              </a:rPr>
-              <a:t>“</a:t>
-            </a:r>
-            <a:r>
-              <a:rPr b="1" lang="en-US" sz="2000" spc="-1" strike="noStrike">
-                <a:solidFill>
-                  <a:srgbClr val="000000"/>
-                </a:solidFill>
-                <a:latin typeface="Courier New"/>
-              </a:rPr>
-              <a:t>OKAY</a:t>
-            </a:r>
-            <a:r>
-              <a:rPr b="0" lang="en-US" sz="2000" spc="-1" strike="noStrike">
-                <a:solidFill>
-                  <a:srgbClr val="000000"/>
-                </a:solidFill>
-                <a:latin typeface="Arial"/>
-              </a:rPr>
-              <a:t>”</a:t>
-            </a:r>
-            <a:r>
-              <a:rPr b="0" lang="en-US" sz="2000" spc="-1" strike="noStrike">
-                <a:solidFill>
-                  <a:srgbClr val="000000"/>
-                </a:solidFill>
-                <a:latin typeface="Arial"/>
-              </a:rPr>
-              <a:t>   → </a:t>
-            </a:r>
-            <a:endParaRPr b="0" lang="en-US" sz="2000" spc="-1" strike="noStrike">
-              <a:solidFill>
-                <a:srgbClr val="000000"/>
-              </a:solidFill>
-              <a:latin typeface="Arial"/>
-            </a:endParaRPr>
-          </a:p>
-          <a:p>
-            <a:pPr indent="0">
-              <a:spcAft>
-                <a:spcPts val="1054"/>
-              </a:spcAft>
-              <a:buNone/>
-            </a:pPr>
-            <a:endParaRPr b="0" lang="en-US" sz="2000" spc="-1" strike="noStrike">
-              <a:solidFill>
-                <a:srgbClr val="000000"/>
-              </a:solidFill>
-              <a:latin typeface="Arial"/>
-            </a:endParaRPr>
-          </a:p>
-          <a:p>
-            <a:pPr indent="0">
+              <a:t>PATH</a:t>
+            </a:r>
+            <a:r>
+              <a:rPr b="0" lang="en-US" sz="2000" spc="-1" strike="noStrike">
+                <a:solidFill>
+                  <a:srgbClr val="000000"/>
+                </a:solidFill>
+                <a:latin typeface="Arial"/>
+              </a:rPr>
+              <a:t> variable </a:t>
+            </a:r>
+            <a:endParaRPr b="0" lang="en-US" sz="2000" spc="-1" strike="noStrike">
+              <a:solidFill>
+                <a:srgbClr val="000000"/>
+              </a:solidFill>
+              <a:latin typeface="Arial"/>
+            </a:endParaRPr>
+          </a:p>
+          <a:p>
+            <a:pPr marL="432000" indent="-324000">
+              <a:spcAft>
+                <a:spcPts val="1054"/>
+              </a:spcAft>
+              <a:buClr>
+                <a:srgbClr val="91d93f"/>
+              </a:buClr>
+              <a:buSzPct val="45000"/>
+              <a:buFont typeface="Wingdings" charset="2"/>
+              <a:buChar char=""/>
+            </a:pPr>
+            <a:r>
+              <a:rPr b="0" lang="en-US" sz="2000" spc="-1" strike="noStrike">
+                <a:solidFill>
+                  <a:srgbClr val="000000"/>
+                </a:solidFill>
+                <a:latin typeface="Arial"/>
+              </a:rPr>
+              <a:t>The whole thing waits until done like a shell </a:t>
+            </a:r>
+            <a:endParaRPr b="0" lang="en-US" sz="2000" spc="-1" strike="noStrike">
+              <a:solidFill>
+                <a:srgbClr val="000000"/>
+              </a:solidFill>
+              <a:latin typeface="Arial"/>
+            </a:endParaRPr>
+          </a:p>
+          <a:p>
+            <a:pPr marL="432000" indent="0">
               <a:spcAft>
                 <a:spcPts val="1054"/>
               </a:spcAft>
@@ -5411,7 +5836,7 @@
       </p:grpSpPr>
       <p:sp>
         <p:nvSpPr>
-          <p:cNvPr id="60" name="PlaceHolder 1"/>
+          <p:cNvPr id="58" name="PlaceHolder 1"/>
           <p:cNvSpPr>
             <a:spLocks noGrp="1"/>
           </p:cNvSpPr>
@@ -5447,7 +5872,7 @@
                 </a:solidFill>
                 <a:latin typeface="Arial"/>
               </a:rPr>
-              <a:t>Flow Protocol – previewing a record</a:t>
+              <a:t>Passing Connectors</a:t>
             </a:r>
             <a:endParaRPr b="0" lang="en-US" sz="2700" spc="-1" strike="noStrike">
               <a:solidFill>
@@ -5460,7 +5885,7 @@
       </p:sp>
       <p:sp>
         <p:nvSpPr>
-          <p:cNvPr id="61" name="PlaceHolder 2"/>
+          <p:cNvPr id="59" name="PlaceHolder 2"/>
           <p:cNvSpPr>
             <a:spLocks noGrp="1"/>
           </p:cNvSpPr>
@@ -5470,8 +5895,8 @@
         </p:nvSpPr>
         <p:spPr>
           <a:xfrm>
-            <a:off x="685800" y="1371600"/>
-            <a:ext cx="2514600" cy="3599640"/>
+            <a:off x="539640" y="1349640"/>
+            <a:ext cx="8997120" cy="3599640"/>
           </a:xfrm>
           <a:prstGeom prst="rect">
             <a:avLst/>
@@ -5492,36 +5917,182 @@
               </a:spcAft>
               <a:buNone/>
             </a:pPr>
-            <a:endParaRPr b="0" lang="en-US" sz="2000" spc="-1" strike="noStrike">
-              <a:solidFill>
-                <a:srgbClr val="000000"/>
-              </a:solidFill>
-              <a:latin typeface="Arial"/>
-            </a:endParaRPr>
-          </a:p>
-          <a:p>
-            <a:pPr indent="0">
-              <a:spcAft>
-                <a:spcPts val="1054"/>
-              </a:spcAft>
-              <a:buNone/>
-            </a:pPr>
-            <a:r>
-              <a:rPr b="0" lang="en-US" sz="2000" spc="-1" strike="noStrike">
-                <a:solidFill>
-                  <a:srgbClr val="000000"/>
-                </a:solidFill>
-                <a:latin typeface="Arial"/>
-              </a:rPr>
-              <a:t>Producer has 1234 bytes to send, calls an ‘</a:t>
-            </a:r>
-            <a:r>
-              <a:rPr b="0" lang="en-US" sz="2000" spc="-1" strike="noStrike">
+            <a:r>
+              <a:rPr b="0" lang="en-US" sz="2000" spc="-1" strike="noStrike">
+                <a:solidFill>
+                  <a:srgbClr val="000000"/>
+                </a:solidFill>
+                <a:latin typeface="Arial"/>
+              </a:rPr>
+              <a:t>Connector Descriptor passed from dispatcher to stages </a:t>
+            </a:r>
+            <a:endParaRPr b="0" lang="en-US" sz="2000" spc="-1" strike="noStrike">
+              <a:solidFill>
+                <a:srgbClr val="000000"/>
+              </a:solidFill>
+              <a:latin typeface="Arial"/>
+            </a:endParaRPr>
+          </a:p>
+          <a:p>
+            <a:pPr indent="0">
+              <a:spcAft>
+                <a:spcPts val="1054"/>
+              </a:spcAft>
+              <a:buNone/>
+            </a:pPr>
+            <a:endParaRPr b="0" lang="en-US" sz="2000" spc="-1" strike="noStrike">
+              <a:solidFill>
+                <a:srgbClr val="000000"/>
+              </a:solidFill>
+              <a:latin typeface="Arial"/>
+            </a:endParaRPr>
+          </a:p>
+          <a:p>
+            <a:pPr indent="0" algn="ctr">
+              <a:spcAft>
+                <a:spcPts val="1054"/>
+              </a:spcAft>
+              <a:buNone/>
+            </a:pPr>
+            <a:r>
+              <a:rPr b="1" lang="en-US" sz="2000" spc="-1" strike="noStrike">
                 <a:solidFill>
                   <a:srgbClr val="000000"/>
                 </a:solidFill>
                 <a:latin typeface="Courier New"/>
               </a:rPr>
+              <a:t>*.</a:t>
+            </a:r>
+            <a:r>
+              <a:rPr b="0" lang="en-US" sz="2000" spc="-1" strike="noStrike">
+                <a:solidFill>
+                  <a:srgbClr val="000000"/>
+                </a:solidFill>
+                <a:latin typeface="Arial"/>
+              </a:rPr>
+              <a:t> [input|output] </a:t>
+            </a:r>
+            <a:r>
+              <a:rPr b="1" lang="en-US" sz="2000" spc="-1" strike="noStrike">
+                <a:solidFill>
+                  <a:srgbClr val="000000"/>
+                </a:solidFill>
+                <a:latin typeface="Courier New"/>
+              </a:rPr>
+              <a:t>.</a:t>
+            </a:r>
+            <a:r>
+              <a:rPr b="0" lang="en-US" sz="2000" spc="-1" strike="noStrike">
+                <a:solidFill>
+                  <a:srgbClr val="000000"/>
+                </a:solidFill>
+                <a:latin typeface="Arial"/>
+              </a:rPr>
+              <a:t> [name|number] </a:t>
+            </a:r>
+            <a:r>
+              <a:rPr b="1" lang="en-US" sz="2000" spc="-1" strike="noStrike">
+                <a:solidFill>
+                  <a:srgbClr val="000000"/>
+                </a:solidFill>
+                <a:latin typeface="Courier New"/>
+              </a:rPr>
+              <a:t>:</a:t>
+            </a:r>
+            <a:r>
+              <a:rPr b="0" lang="en-US" sz="2000" spc="-1" strike="noStrike">
+                <a:solidFill>
+                  <a:srgbClr val="000000"/>
+                </a:solidFill>
+                <a:latin typeface="Arial"/>
+              </a:rPr>
+              <a:t> fdfwd </a:t>
+            </a:r>
+            <a:r>
+              <a:rPr b="1" lang="en-US" sz="2000" spc="-1" strike="noStrike">
+                <a:solidFill>
+                  <a:srgbClr val="000000"/>
+                </a:solidFill>
+                <a:latin typeface="Courier New"/>
+              </a:rPr>
+              <a:t>,</a:t>
+            </a:r>
+            <a:r>
+              <a:rPr b="0" lang="en-US" sz="2000" spc="-1" strike="noStrike">
+                <a:solidFill>
+                  <a:srgbClr val="000000"/>
+                </a:solidFill>
+                <a:latin typeface="Arial"/>
+              </a:rPr>
+              <a:t> fdrev</a:t>
+            </a:r>
+            <a:endParaRPr b="0" lang="en-US" sz="2000" spc="-1" strike="noStrike">
+              <a:solidFill>
+                <a:srgbClr val="000000"/>
+              </a:solidFill>
+              <a:latin typeface="Arial"/>
+            </a:endParaRPr>
+          </a:p>
+          <a:p>
+            <a:pPr indent="0">
+              <a:spcAft>
+                <a:spcPts val="1054"/>
+              </a:spcAft>
+              <a:buNone/>
+            </a:pPr>
+            <a:endParaRPr b="0" lang="en-US" sz="2000" spc="-1" strike="noStrike">
+              <a:solidFill>
+                <a:srgbClr val="000000"/>
+              </a:solidFill>
+              <a:latin typeface="Arial"/>
+            </a:endParaRPr>
+          </a:p>
+          <a:p>
+            <a:pPr marL="432000" indent="-324000">
+              <a:spcAft>
+                <a:spcPts val="1054"/>
+              </a:spcAft>
+              <a:buClr>
+                <a:srgbClr val="91d93f"/>
+              </a:buClr>
+              <a:buSzPct val="45000"/>
+              <a:buFont typeface="Wingdings" charset="2"/>
+              <a:buChar char=""/>
+            </a:pPr>
+            <a:r>
+              <a:rPr b="0" lang="en-US" sz="2000" spc="-1" strike="noStrike">
+                <a:solidFill>
+                  <a:srgbClr val="000000"/>
+                </a:solidFill>
+                <a:latin typeface="Arial"/>
+              </a:rPr>
+              <a:t>Asterisk, dot, “</a:t>
+            </a:r>
+            <a:r>
+              <a:rPr b="0" lang="en-US" sz="2000" spc="-1" strike="noStrike">
+                <a:solidFill>
+                  <a:srgbClr val="000000"/>
+                </a:solidFill>
+                <a:latin typeface="Courier New"/>
+              </a:rPr>
+              <a:t>INPUT</a:t>
+            </a:r>
+            <a:r>
+              <a:rPr b="0" lang="en-US" sz="2000" spc="-1" strike="noStrike">
+                <a:solidFill>
+                  <a:srgbClr val="000000"/>
+                </a:solidFill>
+                <a:latin typeface="Arial"/>
+              </a:rPr>
+              <a:t>” or “</a:t>
+            </a:r>
+            <a:r>
+              <a:rPr b="0" lang="en-US" sz="2000" spc="-1" strike="noStrike">
+                <a:solidFill>
+                  <a:srgbClr val="000000"/>
+                </a:solidFill>
+                <a:latin typeface="Courier New"/>
+              </a:rPr>
               <a:t>OUTPUT</a:t>
             </a:r>
             <a:r>
@@ -5531,525 +6102,64 @@
                 </a:solidFill>
                 <a:latin typeface="Arial"/>
               </a:rPr>
-              <a:t>’, passes metadata and blocks</a:t>
-            </a:r>
-            <a:endParaRPr b="0" lang="en-US" sz="2000" spc="-1" strike="noStrike">
-              <a:solidFill>
-                <a:srgbClr val="000000"/>
-              </a:solidFill>
-              <a:latin typeface="Arial"/>
-            </a:endParaRPr>
-          </a:p>
-          <a:p>
-            <a:pPr indent="0">
-              <a:spcAft>
-                <a:spcPts val="1054"/>
-              </a:spcAft>
-              <a:buNone/>
-            </a:pPr>
-            <a:endParaRPr b="0" lang="en-US" sz="2000" spc="-1" strike="noStrike">
-              <a:solidFill>
-                <a:srgbClr val="000000"/>
-              </a:solidFill>
-              <a:latin typeface="Arial"/>
-            </a:endParaRPr>
-          </a:p>
-          <a:p>
-            <a:pPr indent="0">
-              <a:spcAft>
-                <a:spcPts val="1054"/>
-              </a:spcAft>
-              <a:buNone/>
-            </a:pPr>
-            <a:r>
-              <a:rPr b="0" lang="en-US" sz="2000" spc="-1" strike="noStrike">
-                <a:solidFill>
-                  <a:srgbClr val="000000"/>
-                </a:solidFill>
-                <a:latin typeface="Arial"/>
-              </a:rPr>
-              <a:t>When consumer returns “</a:t>
-            </a:r>
-            <a:r>
-              <a:rPr b="0" lang="en-US" sz="2000" spc="-1" strike="noStrike">
-                <a:solidFill>
-                  <a:srgbClr val="000000"/>
-                </a:solidFill>
-                <a:latin typeface="Courier New"/>
-              </a:rPr>
-              <a:t>PEEK</a:t>
-            </a:r>
-            <a:r>
-              <a:rPr b="0" lang="en-US" sz="2000" spc="-1" strike="noStrike">
-                <a:solidFill>
-                  <a:srgbClr val="000000"/>
-                </a:solidFill>
-                <a:latin typeface="Arial"/>
-              </a:rPr>
-              <a:t>”, producer restarts</a:t>
-            </a:r>
-            <a:endParaRPr b="0" lang="en-US" sz="2000" spc="-1" strike="noStrike">
-              <a:solidFill>
-                <a:srgbClr val="000000"/>
-              </a:solidFill>
-              <a:latin typeface="Arial"/>
-            </a:endParaRPr>
-          </a:p>
-          <a:p>
-            <a:pPr indent="0">
-              <a:spcAft>
-                <a:spcPts val="1054"/>
-              </a:spcAft>
-              <a:buNone/>
-            </a:pPr>
-            <a:endParaRPr b="0" lang="en-US" sz="2000" spc="-1" strike="noStrike">
-              <a:solidFill>
-                <a:srgbClr val="000000"/>
-              </a:solidFill>
-              <a:latin typeface="Arial"/>
-            </a:endParaRPr>
-          </a:p>
-        </p:txBody>
-      </p:sp>
-      <p:sp>
-        <p:nvSpPr>
-          <p:cNvPr id="62" name="PlaceHolder 3"/>
-          <p:cNvSpPr>
-            <a:spLocks noGrp="1"/>
-          </p:cNvSpPr>
-          <p:nvPr>
-            <p:ph/>
-          </p:nvPr>
-        </p:nvSpPr>
-        <p:spPr>
-          <a:xfrm>
-            <a:off x="6858000" y="1350000"/>
-            <a:ext cx="2514600" cy="3599640"/>
-          </a:xfrm>
-          <a:prstGeom prst="rect">
-            <a:avLst/>
-          </a:prstGeom>
-          <a:noFill/>
-          <a:ln w="0">
-            <a:noFill/>
-          </a:ln>
-        </p:spPr>
-        <p:txBody>
-          <a:bodyPr lIns="0" rIns="0" tIns="0" bIns="0" anchor="t">
-            <a:normAutofit/>
-          </a:bodyPr>
-          <a:p>
-            <a:pPr indent="0" algn="r">
-              <a:spcAft>
-                <a:spcPts val="1054"/>
-              </a:spcAft>
-              <a:buNone/>
-            </a:pPr>
-            <a:endParaRPr b="0" lang="en-US" sz="2000" spc="-1" strike="noStrike">
-              <a:solidFill>
-                <a:srgbClr val="000000"/>
-              </a:solidFill>
-              <a:latin typeface="Arial"/>
-            </a:endParaRPr>
-          </a:p>
-          <a:p>
-            <a:pPr indent="0" algn="r">
-              <a:spcAft>
-                <a:spcPts val="1054"/>
-              </a:spcAft>
-              <a:buNone/>
-            </a:pPr>
-            <a:r>
-              <a:rPr b="0" lang="en-US" sz="2000" spc="-1" strike="noStrike">
-                <a:solidFill>
-                  <a:srgbClr val="000000"/>
-                </a:solidFill>
-                <a:latin typeface="Arial"/>
-              </a:rPr>
-              <a:t>Consumer issues a ‘</a:t>
-            </a:r>
-            <a:r>
-              <a:rPr b="0" lang="en-US" sz="2000" spc="-1" strike="noStrike">
-                <a:solidFill>
-                  <a:srgbClr val="000000"/>
-                </a:solidFill>
-                <a:latin typeface="Courier New"/>
-              </a:rPr>
-              <a:t>PEEKTO</a:t>
-            </a:r>
-            <a:r>
-              <a:rPr b="0" lang="en-US" sz="2000" spc="-1" strike="noStrike">
-                <a:solidFill>
-                  <a:srgbClr val="000000"/>
-                </a:solidFill>
-                <a:latin typeface="Arial"/>
-              </a:rPr>
-              <a:t>’ </a:t>
-            </a:r>
-            <a:r>
-              <a:rPr b="0" lang="en-US" sz="2000" spc="-1" strike="noStrike">
-                <a:solidFill>
-                  <a:srgbClr val="000000"/>
-                </a:solidFill>
-                <a:latin typeface="Arial"/>
-              </a:rPr>
-              <a:t>and drives the transaction.</a:t>
-            </a:r>
-            <a:br>
-              <a:rPr sz="2000"/>
-            </a:br>
-            <a:r>
-              <a:rPr b="0" lang="en-US" sz="2000" spc="-1" strike="noStrike">
-                <a:solidFill>
-                  <a:srgbClr val="000000"/>
-                </a:solidFill>
-                <a:latin typeface="Arial"/>
-              </a:rPr>
-              <a:t> It confirms that its buffer can hold the record coming, returns “</a:t>
-            </a:r>
-            <a:r>
-              <a:rPr b="0" lang="en-US" sz="2000" spc="-1" strike="noStrike">
-                <a:solidFill>
-                  <a:srgbClr val="000000"/>
-                </a:solidFill>
-                <a:latin typeface="Courier New"/>
-              </a:rPr>
-              <a:t>PEEK</a:t>
-            </a:r>
-            <a:r>
-              <a:rPr b="0" lang="en-US" sz="2000" spc="-1" strike="noStrike">
-                <a:solidFill>
-                  <a:srgbClr val="000000"/>
-                </a:solidFill>
-                <a:latin typeface="Arial"/>
-              </a:rPr>
-              <a:t>” and reads, then unblocks</a:t>
-            </a:r>
-            <a:endParaRPr b="0" lang="en-US" sz="2000" spc="-1" strike="noStrike">
-              <a:solidFill>
-                <a:srgbClr val="000000"/>
-              </a:solidFill>
-              <a:latin typeface="Arial"/>
-            </a:endParaRPr>
-          </a:p>
-          <a:p>
-            <a:pPr indent="0" algn="r">
-              <a:spcAft>
-                <a:spcPts val="1054"/>
-              </a:spcAft>
-              <a:buNone/>
-            </a:pPr>
-            <a:endParaRPr b="0" lang="en-US" sz="2000" spc="-1" strike="noStrike">
-              <a:solidFill>
-                <a:srgbClr val="000000"/>
-              </a:solidFill>
-              <a:latin typeface="Arial"/>
-            </a:endParaRPr>
-          </a:p>
-        </p:txBody>
-      </p:sp>
-      <p:sp>
-        <p:nvSpPr>
-          <p:cNvPr id="63" name="PlaceHolder 4"/>
-          <p:cNvSpPr>
-            <a:spLocks noGrp="1"/>
-          </p:cNvSpPr>
-          <p:nvPr>
-            <p:ph/>
-          </p:nvPr>
-        </p:nvSpPr>
-        <p:spPr>
-          <a:xfrm>
-            <a:off x="3429000" y="1350000"/>
-            <a:ext cx="3200400" cy="3599640"/>
-          </a:xfrm>
-          <a:prstGeom prst="rect">
-            <a:avLst/>
-          </a:prstGeom>
-          <a:noFill/>
-          <a:ln w="0">
-            <a:noFill/>
-          </a:ln>
-        </p:spPr>
-        <p:txBody>
-          <a:bodyPr lIns="0" rIns="0" tIns="0" bIns="0" anchor="t">
-            <a:normAutofit/>
-          </a:bodyPr>
-          <a:p>
-            <a:pPr indent="0">
-              <a:spcAft>
-                <a:spcPts val="1054"/>
-              </a:spcAft>
-              <a:buNone/>
-            </a:pPr>
-            <a:r>
-              <a:rPr b="0" lang="en-US" sz="2000" spc="-1" strike="noStrike">
-                <a:solidFill>
-                  <a:srgbClr val="000000"/>
-                </a:solidFill>
-                <a:latin typeface="Arial"/>
-              </a:rPr>
-              <a:t>fdforward               fdreverse</a:t>
-            </a:r>
-            <a:endParaRPr b="0" lang="en-US" sz="2000" spc="-1" strike="noStrike">
-              <a:solidFill>
-                <a:srgbClr val="000000"/>
-              </a:solidFill>
-              <a:latin typeface="Arial"/>
-            </a:endParaRPr>
-          </a:p>
-          <a:p>
-            <a:pPr indent="0" algn="r">
-              <a:spcAft>
-                <a:spcPts val="1054"/>
-              </a:spcAft>
-              <a:buNone/>
-            </a:pPr>
-            <a:r>
-              <a:rPr b="0" lang="en-US" sz="2000" spc="-1" strike="noStrike">
-                <a:solidFill>
-                  <a:srgbClr val="000000"/>
-                </a:solidFill>
-                <a:latin typeface="Arial"/>
-              </a:rPr>
-              <a:t> ←   “</a:t>
-            </a:r>
-            <a:r>
-              <a:rPr b="1" lang="en-US" sz="2000" spc="-1" strike="noStrike">
-                <a:solidFill>
-                  <a:srgbClr val="000000"/>
-                </a:solidFill>
-                <a:latin typeface="Courier New"/>
-              </a:rPr>
-              <a:t>STAT</a:t>
-            </a:r>
-            <a:r>
-              <a:rPr b="0" lang="en-US" sz="2000" spc="-1" strike="noStrike">
-                <a:solidFill>
-                  <a:srgbClr val="000000"/>
-                </a:solidFill>
-                <a:latin typeface="Arial"/>
-              </a:rPr>
-              <a:t>”</a:t>
-            </a:r>
-            <a:endParaRPr b="0" lang="en-US" sz="2000" spc="-1" strike="noStrike">
-              <a:solidFill>
-                <a:srgbClr val="000000"/>
-              </a:solidFill>
-              <a:latin typeface="Arial"/>
-            </a:endParaRPr>
-          </a:p>
-          <a:p>
-            <a:pPr indent="0">
-              <a:spcAft>
-                <a:spcPts val="1054"/>
-              </a:spcAft>
-              <a:buNone/>
-            </a:pPr>
-            <a:r>
-              <a:rPr b="0" lang="en-US" sz="2000" spc="-1" strike="noStrike">
-                <a:solidFill>
-                  <a:srgbClr val="000000"/>
-                </a:solidFill>
-                <a:latin typeface="Arial"/>
-              </a:rPr>
-              <a:t>“</a:t>
-            </a:r>
-            <a:r>
-              <a:rPr b="1" lang="en-US" sz="2000" spc="-1" strike="noStrike">
-                <a:solidFill>
-                  <a:srgbClr val="000000"/>
-                </a:solidFill>
-                <a:latin typeface="Courier New"/>
-              </a:rPr>
-              <a:t>DATA 1234</a:t>
-            </a:r>
-            <a:r>
-              <a:rPr b="0" lang="en-US" sz="2000" spc="-1" strike="noStrike">
-                <a:solidFill>
-                  <a:srgbClr val="000000"/>
-                </a:solidFill>
-                <a:latin typeface="Arial"/>
-              </a:rPr>
-              <a:t>”</a:t>
-            </a:r>
-            <a:r>
-              <a:rPr b="0" lang="en-US" sz="2000" spc="-1" strike="noStrike">
-                <a:solidFill>
-                  <a:srgbClr val="000000"/>
-                </a:solidFill>
-                <a:latin typeface="Arial"/>
-              </a:rPr>
-              <a:t>   → </a:t>
-            </a:r>
-            <a:endParaRPr b="0" lang="en-US" sz="2000" spc="-1" strike="noStrike">
-              <a:solidFill>
-                <a:srgbClr val="000000"/>
-              </a:solidFill>
-              <a:latin typeface="Arial"/>
-            </a:endParaRPr>
-          </a:p>
-          <a:p>
-            <a:pPr indent="0" algn="r">
-              <a:spcAft>
-                <a:spcPts val="1054"/>
-              </a:spcAft>
-              <a:buNone/>
-            </a:pPr>
-            <a:r>
-              <a:rPr b="0" lang="en-US" sz="2000" spc="-1" strike="noStrike">
-                <a:solidFill>
-                  <a:srgbClr val="000000"/>
-                </a:solidFill>
-                <a:latin typeface="Arial"/>
-              </a:rPr>
-              <a:t> ←   “</a:t>
-            </a:r>
-            <a:r>
-              <a:rPr b="1" lang="en-US" sz="2000" spc="-1" strike="noStrike">
-                <a:solidFill>
-                  <a:srgbClr val="000000"/>
-                </a:solidFill>
-                <a:latin typeface="Courier New"/>
-              </a:rPr>
-              <a:t>PEEK 1234</a:t>
-            </a:r>
-            <a:r>
-              <a:rPr b="0" lang="en-US" sz="2000" spc="-1" strike="noStrike">
-                <a:solidFill>
-                  <a:srgbClr val="000000"/>
-                </a:solidFill>
-                <a:latin typeface="Arial"/>
-              </a:rPr>
-              <a:t>”</a:t>
-            </a:r>
-            <a:endParaRPr b="0" lang="en-US" sz="2000" spc="-1" strike="noStrike">
-              <a:solidFill>
-                <a:srgbClr val="000000"/>
-              </a:solidFill>
-              <a:latin typeface="Arial"/>
-            </a:endParaRPr>
-          </a:p>
-          <a:p>
-            <a:pPr indent="0">
-              <a:spcAft>
-                <a:spcPts val="1054"/>
-              </a:spcAft>
-              <a:buNone/>
-            </a:pPr>
-            <a:r>
-              <a:rPr b="0" i="1" lang="en-US" sz="2000" spc="-1" strike="noStrike">
-                <a:solidFill>
-                  <a:srgbClr val="000000"/>
-                </a:solidFill>
-                <a:latin typeface="Arial"/>
-              </a:rPr>
-              <a:t>1234 bytes of data</a:t>
-            </a:r>
-            <a:r>
-              <a:rPr b="0" i="1" lang="en-US" sz="2000" spc="-1" strike="noStrike">
-                <a:solidFill>
-                  <a:srgbClr val="000000"/>
-                </a:solidFill>
-                <a:latin typeface="Arial"/>
-              </a:rPr>
-              <a:t>   → </a:t>
-            </a:r>
-            <a:endParaRPr b="0" lang="en-US" sz="2000" spc="-1" strike="noStrike">
-              <a:solidFill>
-                <a:srgbClr val="000000"/>
-              </a:solidFill>
-              <a:latin typeface="Arial"/>
-            </a:endParaRPr>
-          </a:p>
-          <a:p>
-            <a:pPr indent="0">
-              <a:spcAft>
-                <a:spcPts val="1054"/>
-              </a:spcAft>
-              <a:buNone/>
-            </a:pPr>
-            <a:endParaRPr b="0" lang="en-US" sz="2000" spc="-1" strike="noStrike">
-              <a:solidFill>
-                <a:srgbClr val="000000"/>
-              </a:solidFill>
-              <a:latin typeface="Arial"/>
-            </a:endParaRPr>
-          </a:p>
-          <a:p>
-            <a:pPr indent="0">
-              <a:spcAft>
-                <a:spcPts val="1054"/>
-              </a:spcAft>
-              <a:buNone/>
-            </a:pPr>
-            <a:endParaRPr b="0" lang="en-US" sz="2000" spc="-1" strike="noStrike">
-              <a:solidFill>
-                <a:srgbClr val="000000"/>
-              </a:solidFill>
-              <a:latin typeface="Arial"/>
-            </a:endParaRPr>
-          </a:p>
-          <a:p>
-            <a:pPr indent="0">
-              <a:spcAft>
-                <a:spcPts val="1054"/>
-              </a:spcAft>
-              <a:buNone/>
-            </a:pPr>
-            <a:r>
-              <a:rPr b="0" lang="en-US" sz="2000" spc="-1" strike="noStrike">
-                <a:solidFill>
-                  <a:srgbClr val="000000"/>
-                </a:solidFill>
-                <a:latin typeface="Arial"/>
-              </a:rPr>
-              <a:t>This </a:t>
-            </a:r>
-            <a:r>
-              <a:rPr b="0" i="1" lang="en-US" sz="2000" spc="-1" strike="noStrike">
-                <a:solidFill>
-                  <a:srgbClr val="000000"/>
-                </a:solidFill>
-                <a:latin typeface="Arial"/>
-              </a:rPr>
-              <a:t>does not</a:t>
-            </a:r>
-            <a:r>
-              <a:rPr b="0" lang="en-US" sz="2000" spc="-1" strike="noStrike">
-                <a:solidFill>
-                  <a:srgbClr val="000000"/>
-                </a:solidFill>
-                <a:latin typeface="Arial"/>
-              </a:rPr>
-              <a:t> unblock </a:t>
-            </a:r>
-            <a:br>
-              <a:rPr sz="2000"/>
-            </a:br>
-            <a:r>
-              <a:rPr b="0" lang="en-US" sz="2000" spc="-1" strike="noStrike">
-                <a:solidFill>
-                  <a:srgbClr val="000000"/>
-                </a:solidFill>
-                <a:latin typeface="Arial"/>
-              </a:rPr>
-              <a:t>the producer</a:t>
-            </a:r>
-            <a:endParaRPr b="0" lang="en-US" sz="2000" spc="-1" strike="noStrike">
-              <a:solidFill>
-                <a:srgbClr val="000000"/>
-              </a:solidFill>
-              <a:latin typeface="Arial"/>
-            </a:endParaRPr>
-          </a:p>
-          <a:p>
-            <a:pPr indent="0">
-              <a:spcAft>
-                <a:spcPts val="1054"/>
-              </a:spcAft>
-              <a:buNone/>
-            </a:pPr>
+              <a:t>” </a:t>
+            </a:r>
+            <a:endParaRPr b="0" lang="en-US" sz="2000" spc="-1" strike="noStrike">
+              <a:solidFill>
+                <a:srgbClr val="000000"/>
+              </a:solidFill>
+              <a:latin typeface="Arial"/>
+            </a:endParaRPr>
+          </a:p>
+          <a:p>
+            <a:pPr marL="432000" indent="-324000">
+              <a:spcAft>
+                <a:spcPts val="1054"/>
+              </a:spcAft>
+              <a:buClr>
+                <a:srgbClr val="91d93f"/>
+              </a:buClr>
+              <a:buSzPct val="45000"/>
+              <a:buFont typeface="Wingdings" charset="2"/>
+              <a:buChar char=""/>
+            </a:pPr>
+            <a:r>
+              <a:rPr b="0" lang="en-US" sz="2000" spc="-1" strike="noStrike">
+                <a:solidFill>
+                  <a:srgbClr val="000000"/>
+                </a:solidFill>
+                <a:latin typeface="Arial"/>
+              </a:rPr>
+              <a:t>Dot, stream name or stream number </a:t>
+            </a:r>
+            <a:endParaRPr b="0" lang="en-US" sz="2000" spc="-1" strike="noStrike">
+              <a:solidFill>
+                <a:srgbClr val="000000"/>
+              </a:solidFill>
+              <a:latin typeface="Arial"/>
+            </a:endParaRPr>
+          </a:p>
+          <a:p>
+            <a:pPr marL="432000" indent="-324000">
+              <a:spcAft>
+                <a:spcPts val="1054"/>
+              </a:spcAft>
+              <a:buClr>
+                <a:srgbClr val="91d93f"/>
+              </a:buClr>
+              <a:buSzPct val="45000"/>
+              <a:buFont typeface="Wingdings" charset="2"/>
+              <a:buChar char=""/>
+            </a:pPr>
+            <a:r>
+              <a:rPr b="0" lang="en-US" sz="2000" spc="-1" strike="noStrike">
+                <a:solidFill>
+                  <a:srgbClr val="000000"/>
+                </a:solidFill>
+                <a:latin typeface="Arial"/>
+              </a:rPr>
+              <a:t>Colon, forward file descriptor, comma, reverse file descriptor </a:t>
+            </a:r>
             <a:endParaRPr b="0" lang="en-US" sz="2000" spc="-1" strike="noStrike">
               <a:solidFill>
                 <a:srgbClr val="000000"/>
@@ -6091,7 +6201,7 @@
       </p:grpSpPr>
       <p:sp>
         <p:nvSpPr>
-          <p:cNvPr id="64" name="PlaceHolder 1"/>
+          <p:cNvPr id="60" name="PlaceHolder 1"/>
           <p:cNvSpPr>
             <a:spLocks noGrp="1"/>
           </p:cNvSpPr>
@@ -6120,6 +6230,15 @@
             <a:pPr indent="0">
               <a:buNone/>
             </a:pPr>
+            <a:r>
+              <a:rPr b="0" lang="en-US" sz="2700" spc="-1" strike="noStrike">
+                <a:solidFill>
+                  <a:srgbClr val="000000"/>
+                </a:solidFill>
+                <a:latin typeface="Arial"/>
+              </a:rPr>
+              <a:t>Passing Connectors</a:t>
+            </a:r>
             <a:endParaRPr b="0" lang="en-US" sz="2700" spc="-1" strike="noStrike">
               <a:solidFill>
                 <a:srgbClr val="000000"/>
@@ -6131,7 +6250,7 @@
       </p:sp>
       <p:sp>
         <p:nvSpPr>
-          <p:cNvPr id="65" name="PlaceHolder 2"/>
+          <p:cNvPr id="61" name="PlaceHolder 2"/>
           <p:cNvSpPr>
             <a:spLocks noGrp="1"/>
           </p:cNvSpPr>
@@ -6156,6 +6275,237 @@
           <a:bodyPr lIns="0" rIns="0" tIns="0" bIns="0" anchor="t">
             <a:normAutofit/>
           </a:bodyPr>
+          <a:p>
+            <a:pPr indent="0">
+              <a:spcAft>
+                <a:spcPts val="1054"/>
+              </a:spcAft>
+              <a:buNone/>
+            </a:pPr>
+            <a:r>
+              <a:rPr b="0" lang="en-US" sz="2000" spc="-1" strike="noStrike">
+                <a:solidFill>
+                  <a:srgbClr val="000000"/>
+                </a:solidFill>
+                <a:latin typeface="Arial"/>
+              </a:rPr>
+              <a:t>Connector Descriptors are passed in the POSIX “environment”. </a:t>
+            </a:r>
+            <a:endParaRPr b="0" lang="en-US" sz="2000" spc="-1" strike="noStrike">
+              <a:solidFill>
+                <a:srgbClr val="000000"/>
+              </a:solidFill>
+              <a:latin typeface="Arial"/>
+            </a:endParaRPr>
+          </a:p>
+          <a:p>
+            <a:pPr indent="0">
+              <a:spcAft>
+                <a:spcPts val="1054"/>
+              </a:spcAft>
+              <a:buNone/>
+            </a:pPr>
+            <a:r>
+              <a:rPr b="0" lang="en-US" sz="2000" spc="-1" strike="noStrike">
+                <a:solidFill>
+                  <a:srgbClr val="000000"/>
+                </a:solidFill>
+                <a:latin typeface="Arial"/>
+              </a:rPr>
+              <a:t>The dispatcher sets the environment variable</a:t>
+            </a:r>
+            <a:r>
+              <a:rPr b="0" lang="en-US" sz="2000" spc="-1" strike="noStrike">
+                <a:solidFill>
+                  <a:srgbClr val="000000"/>
+                </a:solidFill>
+                <a:latin typeface="Courier New"/>
+              </a:rPr>
+              <a:t> </a:t>
+            </a:r>
+            <a:r>
+              <a:rPr b="1" lang="en-US" sz="2000" spc="-1" strike="noStrike">
+                <a:solidFill>
+                  <a:srgbClr val="000000"/>
+                </a:solidFill>
+                <a:latin typeface="Courier New"/>
+              </a:rPr>
+              <a:t>PIPECONNS</a:t>
+            </a:r>
+            <a:r>
+              <a:rPr b="0" lang="en-US" sz="2000" spc="-1" strike="noStrike">
+                <a:solidFill>
+                  <a:srgbClr val="000000"/>
+                </a:solidFill>
+                <a:latin typeface="Courier New"/>
+              </a:rPr>
+              <a:t> </a:t>
+            </a:r>
+            <a:r>
+              <a:rPr b="0" lang="en-US" sz="2000" spc="-1" strike="noStrike">
+                <a:solidFill>
+                  <a:srgbClr val="000000"/>
+                </a:solidFill>
+                <a:latin typeface="Arial"/>
+              </a:rPr>
+              <a:t>uniquely </a:t>
+            </a:r>
+            <a:br>
+              <a:rPr sz="2000"/>
+            </a:br>
+            <a:r>
+              <a:rPr b="0" lang="en-US" sz="2000" spc="-1" strike="noStrike">
+                <a:solidFill>
+                  <a:srgbClr val="000000"/>
+                </a:solidFill>
+                <a:latin typeface="Arial"/>
+              </a:rPr>
+              <a:t>for each stage as it spawns that stage. The variable contains a string of multiple connector specifications following the syntax shown: </a:t>
+            </a:r>
+            <a:endParaRPr b="0" lang="en-US" sz="2000" spc="-1" strike="noStrike">
+              <a:solidFill>
+                <a:srgbClr val="000000"/>
+              </a:solidFill>
+              <a:latin typeface="Arial"/>
+            </a:endParaRPr>
+          </a:p>
+          <a:p>
+            <a:pPr indent="0">
+              <a:spcAft>
+                <a:spcPts val="1054"/>
+              </a:spcAft>
+              <a:buNone/>
+            </a:pPr>
+            <a:endParaRPr b="0" lang="en-US" sz="2000" spc="-1" strike="noStrike">
+              <a:solidFill>
+                <a:srgbClr val="000000"/>
+              </a:solidFill>
+              <a:latin typeface="Arial"/>
+            </a:endParaRPr>
+          </a:p>
+          <a:p>
+            <a:pPr indent="0" algn="ctr">
+              <a:spcAft>
+                <a:spcPts val="1054"/>
+              </a:spcAft>
+              <a:buNone/>
+            </a:pPr>
+            <a:r>
+              <a:rPr b="1" lang="en-US" sz="2000" spc="-1" strike="noStrike">
+                <a:solidFill>
+                  <a:srgbClr val="000000"/>
+                </a:solidFill>
+                <a:latin typeface="Courier New"/>
+              </a:rPr>
+              <a:t>*.</a:t>
+            </a:r>
+            <a:r>
+              <a:rPr b="0" lang="en-US" sz="2000" spc="-1" strike="noStrike">
+                <a:solidFill>
+                  <a:srgbClr val="000000"/>
+                </a:solidFill>
+                <a:latin typeface="Arial"/>
+              </a:rPr>
+              <a:t> [input|output] </a:t>
+            </a:r>
+            <a:r>
+              <a:rPr b="1" lang="en-US" sz="2000" spc="-1" strike="noStrike">
+                <a:solidFill>
+                  <a:srgbClr val="000000"/>
+                </a:solidFill>
+                <a:latin typeface="Courier New"/>
+              </a:rPr>
+              <a:t>.</a:t>
+            </a:r>
+            <a:r>
+              <a:rPr b="0" lang="en-US" sz="2000" spc="-1" strike="noStrike">
+                <a:solidFill>
+                  <a:srgbClr val="000000"/>
+                </a:solidFill>
+                <a:latin typeface="Arial"/>
+              </a:rPr>
+              <a:t> [name|number] </a:t>
+            </a:r>
+            <a:r>
+              <a:rPr b="1" lang="en-US" sz="2000" spc="-1" strike="noStrike">
+                <a:solidFill>
+                  <a:srgbClr val="000000"/>
+                </a:solidFill>
+                <a:latin typeface="Courier New"/>
+              </a:rPr>
+              <a:t>:</a:t>
+            </a:r>
+            <a:r>
+              <a:rPr b="0" lang="en-US" sz="2000" spc="-1" strike="noStrike">
+                <a:solidFill>
+                  <a:srgbClr val="000000"/>
+                </a:solidFill>
+                <a:latin typeface="Arial"/>
+              </a:rPr>
+              <a:t> fdfwd </a:t>
+            </a:r>
+            <a:r>
+              <a:rPr b="1" lang="en-US" sz="2000" spc="-1" strike="noStrike">
+                <a:solidFill>
+                  <a:srgbClr val="000000"/>
+                </a:solidFill>
+                <a:latin typeface="Courier New"/>
+              </a:rPr>
+              <a:t>,</a:t>
+            </a:r>
+            <a:r>
+              <a:rPr b="0" lang="en-US" sz="2000" spc="-1" strike="noStrike">
+                <a:solidFill>
+                  <a:srgbClr val="000000"/>
+                </a:solidFill>
+                <a:latin typeface="Arial"/>
+              </a:rPr>
+              <a:t> fdrev</a:t>
+            </a:r>
+            <a:endParaRPr b="0" lang="en-US" sz="2000" spc="-1" strike="noStrike">
+              <a:solidFill>
+                <a:srgbClr val="000000"/>
+              </a:solidFill>
+              <a:latin typeface="Arial"/>
+            </a:endParaRPr>
+          </a:p>
+          <a:p>
+            <a:pPr indent="0">
+              <a:spcAft>
+                <a:spcPts val="1054"/>
+              </a:spcAft>
+              <a:buNone/>
+            </a:pPr>
+            <a:endParaRPr b="0" lang="en-US" sz="2000" spc="-1" strike="noStrike">
+              <a:solidFill>
+                <a:srgbClr val="000000"/>
+              </a:solidFill>
+              <a:latin typeface="Arial"/>
+            </a:endParaRPr>
+          </a:p>
+          <a:p>
+            <a:pPr indent="0">
+              <a:spcAft>
+                <a:spcPts val="1054"/>
+              </a:spcAft>
+              <a:buNone/>
+            </a:pPr>
+            <a:r>
+              <a:rPr b="0" lang="en-US" sz="2000" spc="-1" strike="noStrike">
+                <a:solidFill>
+                  <a:srgbClr val="000000"/>
+                </a:solidFill>
+                <a:latin typeface="Arial"/>
+              </a:rPr>
+              <a:t>File descriptors opened by the dispatcher and inherited by the stages </a:t>
+            </a:r>
+            <a:endParaRPr b="0" lang="en-US" sz="2000" spc="-1" strike="noStrike">
+              <a:solidFill>
+                <a:srgbClr val="000000"/>
+              </a:solidFill>
+              <a:latin typeface="Arial"/>
+            </a:endParaRPr>
+          </a:p>
           <a:p>
             <a:pPr indent="0">
               <a:spcAft>
@@ -6204,7 +6554,7 @@
       </p:grpSpPr>
       <p:sp>
         <p:nvSpPr>
-          <p:cNvPr id="66" name="PlaceHolder 1"/>
+          <p:cNvPr id="62" name="PlaceHolder 1"/>
           <p:cNvSpPr>
             <a:spLocks noGrp="1"/>
           </p:cNvSpPr>
@@ -6233,6 +6583,15 @@
             <a:pPr indent="0">
               <a:buNone/>
             </a:pPr>
+            <a:r>
+              <a:rPr b="0" lang="en-US" sz="2700" spc="-1" strike="noStrike">
+                <a:solidFill>
+                  <a:srgbClr val="000000"/>
+                </a:solidFill>
+                <a:latin typeface="Arial"/>
+              </a:rPr>
+              <a:t>Flow Protocol – sending a record</a:t>
+            </a:r>
             <a:endParaRPr b="0" lang="en-US" sz="2700" spc="-1" strike="noStrike">
               <a:solidFill>
                 <a:srgbClr val="000000"/>
@@ -6244,7 +6603,7 @@
       </p:sp>
       <p:sp>
         <p:nvSpPr>
-          <p:cNvPr id="67" name="PlaceHolder 2"/>
+          <p:cNvPr id="63" name="PlaceHolder 2"/>
           <p:cNvSpPr>
             <a:spLocks noGrp="1"/>
           </p:cNvSpPr>
@@ -6254,8 +6613,8 @@
         </p:nvSpPr>
         <p:spPr>
           <a:xfrm>
-            <a:off x="539640" y="1349640"/>
-            <a:ext cx="8997120" cy="3599640"/>
+            <a:off x="685800" y="1371600"/>
+            <a:ext cx="2514600" cy="3599640"/>
           </a:xfrm>
           <a:prstGeom prst="rect">
             <a:avLst/>
@@ -6269,6 +6628,620 @@
           <a:bodyPr lIns="0" rIns="0" tIns="0" bIns="0" anchor="t">
             <a:normAutofit/>
           </a:bodyPr>
+          <a:p>
+            <a:pPr indent="0">
+              <a:spcAft>
+                <a:spcPts val="1054"/>
+              </a:spcAft>
+              <a:buNone/>
+            </a:pPr>
+            <a:endParaRPr b="0" lang="en-US" sz="2000" spc="-1" strike="noStrike">
+              <a:solidFill>
+                <a:srgbClr val="000000"/>
+              </a:solidFill>
+              <a:latin typeface="Arial"/>
+            </a:endParaRPr>
+          </a:p>
+          <a:p>
+            <a:pPr indent="0">
+              <a:spcAft>
+                <a:spcPts val="1054"/>
+              </a:spcAft>
+              <a:buNone/>
+            </a:pPr>
+            <a:r>
+              <a:rPr b="0" lang="en-US" sz="2000" spc="-1" strike="noStrike">
+                <a:solidFill>
+                  <a:srgbClr val="000000"/>
+                </a:solidFill>
+                <a:latin typeface="Arial"/>
+              </a:rPr>
+              <a:t>Producer has 1234 bytes to send, calls an ‘</a:t>
+            </a:r>
+            <a:r>
+              <a:rPr b="0" lang="en-US" sz="2000" spc="-1" strike="noStrike">
+                <a:solidFill>
+                  <a:srgbClr val="000000"/>
+                </a:solidFill>
+                <a:latin typeface="Courier New"/>
+              </a:rPr>
+              <a:t>OUTPUT</a:t>
+            </a:r>
+            <a:r>
+              <a:rPr b="0" lang="en-US" sz="2000" spc="-1" strike="noStrike">
+                <a:solidFill>
+                  <a:srgbClr val="000000"/>
+                </a:solidFill>
+                <a:latin typeface="Arial"/>
+              </a:rPr>
+              <a:t>’, passes metadata and blocks</a:t>
+            </a:r>
+            <a:endParaRPr b="0" lang="en-US" sz="2000" spc="-1" strike="noStrike">
+              <a:solidFill>
+                <a:srgbClr val="000000"/>
+              </a:solidFill>
+              <a:latin typeface="Arial"/>
+            </a:endParaRPr>
+          </a:p>
+          <a:p>
+            <a:pPr indent="0">
+              <a:spcAft>
+                <a:spcPts val="1054"/>
+              </a:spcAft>
+              <a:buNone/>
+            </a:pPr>
+            <a:endParaRPr b="0" lang="en-US" sz="2000" spc="-1" strike="noStrike">
+              <a:solidFill>
+                <a:srgbClr val="000000"/>
+              </a:solidFill>
+              <a:latin typeface="Arial"/>
+            </a:endParaRPr>
+          </a:p>
+          <a:p>
+            <a:pPr indent="0">
+              <a:spcAft>
+                <a:spcPts val="1054"/>
+              </a:spcAft>
+              <a:buNone/>
+            </a:pPr>
+            <a:r>
+              <a:rPr b="0" lang="en-US" sz="2000" spc="-1" strike="noStrike">
+                <a:solidFill>
+                  <a:srgbClr val="000000"/>
+                </a:solidFill>
+                <a:latin typeface="Arial"/>
+              </a:rPr>
+              <a:t>After consumer returns “</a:t>
+            </a:r>
+            <a:r>
+              <a:rPr b="0" lang="en-US" sz="2000" spc="-1" strike="noStrike">
+                <a:solidFill>
+                  <a:srgbClr val="000000"/>
+                </a:solidFill>
+                <a:latin typeface="Courier New"/>
+              </a:rPr>
+              <a:t>NEXT</a:t>
+            </a:r>
+            <a:r>
+              <a:rPr b="0" lang="en-US" sz="2000" spc="-1" strike="noStrike">
+                <a:solidFill>
+                  <a:srgbClr val="000000"/>
+                </a:solidFill>
+                <a:latin typeface="Arial"/>
+              </a:rPr>
+              <a:t>”, producer sends “</a:t>
+            </a:r>
+            <a:r>
+              <a:rPr b="0" lang="en-US" sz="2000" spc="-1" strike="noStrike">
+                <a:solidFill>
+                  <a:srgbClr val="000000"/>
+                </a:solidFill>
+                <a:latin typeface="Courier New"/>
+              </a:rPr>
+              <a:t>OKAY</a:t>
+            </a:r>
+            <a:r>
+              <a:rPr b="0" lang="en-US" sz="2000" spc="-1" strike="noStrike">
+                <a:solidFill>
+                  <a:srgbClr val="000000"/>
+                </a:solidFill>
+                <a:latin typeface="Arial"/>
+              </a:rPr>
+              <a:t>” and unblocks</a:t>
+            </a:r>
+            <a:endParaRPr b="0" lang="en-US" sz="2000" spc="-1" strike="noStrike">
+              <a:solidFill>
+                <a:srgbClr val="000000"/>
+              </a:solidFill>
+              <a:latin typeface="Arial"/>
+            </a:endParaRPr>
+          </a:p>
+          <a:p>
+            <a:pPr indent="0">
+              <a:spcAft>
+                <a:spcPts val="1054"/>
+              </a:spcAft>
+              <a:buNone/>
+            </a:pPr>
+            <a:endParaRPr b="0" lang="en-US" sz="2000" spc="-1" strike="noStrike">
+              <a:solidFill>
+                <a:srgbClr val="000000"/>
+              </a:solidFill>
+              <a:latin typeface="Arial"/>
+            </a:endParaRPr>
+          </a:p>
+          <a:p>
+            <a:pPr indent="0">
+              <a:spcAft>
+                <a:spcPts val="1054"/>
+              </a:spcAft>
+              <a:buNone/>
+            </a:pPr>
+            <a:endParaRPr b="0" lang="en-US" sz="2000" spc="-1" strike="noStrike">
+              <a:solidFill>
+                <a:srgbClr val="000000"/>
+              </a:solidFill>
+              <a:latin typeface="Arial"/>
+            </a:endParaRPr>
+          </a:p>
+        </p:txBody>
+      </p:sp>
+      <p:sp>
+        <p:nvSpPr>
+          <p:cNvPr id="64" name="PlaceHolder 3"/>
+          <p:cNvSpPr>
+            <a:spLocks noGrp="1"/>
+          </p:cNvSpPr>
+          <p:nvPr>
+            <p:ph/>
+          </p:nvPr>
+        </p:nvSpPr>
+        <p:spPr>
+          <a:xfrm>
+            <a:off x="6858000" y="1350000"/>
+            <a:ext cx="2514600" cy="3599640"/>
+          </a:xfrm>
+          <a:prstGeom prst="rect">
+            <a:avLst/>
+          </a:prstGeom>
+          <a:noFill/>
+          <a:ln w="0">
+            <a:noFill/>
+          </a:ln>
+        </p:spPr>
+        <p:txBody>
+          <a:bodyPr lIns="0" rIns="0" tIns="0" bIns="0" anchor="t">
+            <a:normAutofit/>
+          </a:bodyPr>
+          <a:p>
+            <a:pPr indent="0" algn="r">
+              <a:spcAft>
+                <a:spcPts val="1054"/>
+              </a:spcAft>
+              <a:buNone/>
+            </a:pPr>
+            <a:endParaRPr b="0" lang="en-US" sz="2000" spc="-1" strike="noStrike">
+              <a:solidFill>
+                <a:srgbClr val="000000"/>
+              </a:solidFill>
+              <a:latin typeface="Arial"/>
+            </a:endParaRPr>
+          </a:p>
+          <a:p>
+            <a:pPr indent="0" algn="r">
+              <a:spcAft>
+                <a:spcPts val="1054"/>
+              </a:spcAft>
+              <a:buNone/>
+            </a:pPr>
+            <a:r>
+              <a:rPr b="0" lang="en-US" sz="2000" spc="-1" strike="noStrike">
+                <a:solidFill>
+                  <a:srgbClr val="000000"/>
+                </a:solidFill>
+                <a:latin typeface="Arial"/>
+              </a:rPr>
+              <a:t>Consumer issues a ‘</a:t>
+            </a:r>
+            <a:r>
+              <a:rPr b="0" lang="en-US" sz="2000" spc="-1" strike="noStrike">
+                <a:solidFill>
+                  <a:srgbClr val="000000"/>
+                </a:solidFill>
+                <a:latin typeface="Courier New"/>
+              </a:rPr>
+              <a:t>READTO</a:t>
+            </a:r>
+            <a:r>
+              <a:rPr b="0" lang="en-US" sz="2000" spc="-1" strike="noStrike">
+                <a:solidFill>
+                  <a:srgbClr val="000000"/>
+                </a:solidFill>
+                <a:latin typeface="Arial"/>
+              </a:rPr>
+              <a:t>’ and drives the transaction.</a:t>
+            </a:r>
+            <a:br>
+              <a:rPr sz="2000"/>
+            </a:br>
+            <a:r>
+              <a:rPr b="0" lang="en-US" sz="2000" spc="-1" strike="noStrike">
+                <a:solidFill>
+                  <a:srgbClr val="000000"/>
+                </a:solidFill>
+                <a:latin typeface="Arial"/>
+              </a:rPr>
+              <a:t> It confirms that its buffer can hold the record coming, returns “</a:t>
+            </a:r>
+            <a:r>
+              <a:rPr b="0" lang="en-US" sz="2000" spc="-1" strike="noStrike">
+                <a:solidFill>
+                  <a:srgbClr val="000000"/>
+                </a:solidFill>
+                <a:latin typeface="Courier New"/>
+              </a:rPr>
+              <a:t>PEEK</a:t>
+            </a:r>
+            <a:r>
+              <a:rPr b="0" lang="en-US" sz="2000" spc="-1" strike="noStrike">
+                <a:solidFill>
+                  <a:srgbClr val="000000"/>
+                </a:solidFill>
+                <a:latin typeface="Arial"/>
+              </a:rPr>
+              <a:t>” and reads, returns “</a:t>
+            </a:r>
+            <a:r>
+              <a:rPr b="0" lang="en-US" sz="2000" spc="-1" strike="noStrike">
+                <a:solidFill>
+                  <a:srgbClr val="000000"/>
+                </a:solidFill>
+                <a:latin typeface="Courier New"/>
+              </a:rPr>
+              <a:t>NEXT</a:t>
+            </a:r>
+            <a:r>
+              <a:rPr b="0" lang="en-US" sz="2000" spc="-1" strike="noStrike">
+                <a:solidFill>
+                  <a:srgbClr val="000000"/>
+                </a:solidFill>
+                <a:latin typeface="Arial"/>
+              </a:rPr>
+              <a:t>”, then unblocks</a:t>
+            </a:r>
+            <a:endParaRPr b="0" lang="en-US" sz="2000" spc="-1" strike="noStrike">
+              <a:solidFill>
+                <a:srgbClr val="000000"/>
+              </a:solidFill>
+              <a:latin typeface="Arial"/>
+            </a:endParaRPr>
+          </a:p>
+          <a:p>
+            <a:pPr indent="0" algn="r">
+              <a:spcAft>
+                <a:spcPts val="1054"/>
+              </a:spcAft>
+              <a:buNone/>
+            </a:pPr>
+            <a:endParaRPr b="0" lang="en-US" sz="2000" spc="-1" strike="noStrike">
+              <a:solidFill>
+                <a:srgbClr val="000000"/>
+              </a:solidFill>
+              <a:latin typeface="Arial"/>
+            </a:endParaRPr>
+          </a:p>
+        </p:txBody>
+      </p:sp>
+      <p:sp>
+        <p:nvSpPr>
+          <p:cNvPr id="65" name="PlaceHolder 4"/>
+          <p:cNvSpPr>
+            <a:spLocks noGrp="1"/>
+          </p:cNvSpPr>
+          <p:nvPr>
+            <p:ph/>
+          </p:nvPr>
+        </p:nvSpPr>
+        <p:spPr>
+          <a:xfrm>
+            <a:off x="3429000" y="1350000"/>
+            <a:ext cx="3200400" cy="3599640"/>
+          </a:xfrm>
+          <a:prstGeom prst="rect">
+            <a:avLst/>
+          </a:prstGeom>
+          <a:noFill/>
+          <a:ln w="0">
+            <a:noFill/>
+          </a:ln>
+        </p:spPr>
+        <p:txBody>
+          <a:bodyPr lIns="0" rIns="0" tIns="0" bIns="0" anchor="t">
+            <a:normAutofit/>
+          </a:bodyPr>
+          <a:p>
+            <a:pPr indent="0">
+              <a:spcAft>
+                <a:spcPts val="1054"/>
+              </a:spcAft>
+              <a:buNone/>
+            </a:pPr>
+            <a:r>
+              <a:rPr b="0" lang="en-US" sz="2000" spc="-1" strike="noStrike">
+                <a:solidFill>
+                  <a:srgbClr val="000000"/>
+                </a:solidFill>
+                <a:latin typeface="Arial"/>
+              </a:rPr>
+              <a:t>fdforward               fdreverse</a:t>
+            </a:r>
+            <a:endParaRPr b="0" lang="en-US" sz="2000" spc="-1" strike="noStrike">
+              <a:solidFill>
+                <a:srgbClr val="000000"/>
+              </a:solidFill>
+              <a:latin typeface="Arial"/>
+            </a:endParaRPr>
+          </a:p>
+          <a:p>
+            <a:pPr indent="0" algn="r">
+              <a:spcAft>
+                <a:spcPts val="1054"/>
+              </a:spcAft>
+              <a:buNone/>
+            </a:pPr>
+            <a:r>
+              <a:rPr b="0" lang="en-US" sz="2000" spc="-1" strike="noStrike">
+                <a:solidFill>
+                  <a:srgbClr val="000000"/>
+                </a:solidFill>
+                <a:latin typeface="Arial"/>
+              </a:rPr>
+              <a:t> ←   “</a:t>
+            </a:r>
+            <a:r>
+              <a:rPr b="1" lang="en-US" sz="2000" spc="-1" strike="noStrike">
+                <a:solidFill>
+                  <a:srgbClr val="000000"/>
+                </a:solidFill>
+                <a:latin typeface="Courier New"/>
+              </a:rPr>
+              <a:t>STAT</a:t>
+            </a:r>
+            <a:r>
+              <a:rPr b="0" lang="en-US" sz="2000" spc="-1" strike="noStrike">
+                <a:solidFill>
+                  <a:srgbClr val="000000"/>
+                </a:solidFill>
+                <a:latin typeface="Arial"/>
+              </a:rPr>
+              <a:t>”</a:t>
+            </a:r>
+            <a:endParaRPr b="0" lang="en-US" sz="2000" spc="-1" strike="noStrike">
+              <a:solidFill>
+                <a:srgbClr val="000000"/>
+              </a:solidFill>
+              <a:latin typeface="Arial"/>
+            </a:endParaRPr>
+          </a:p>
+          <a:p>
+            <a:pPr indent="0">
+              <a:spcAft>
+                <a:spcPts val="1054"/>
+              </a:spcAft>
+              <a:buNone/>
+            </a:pPr>
+            <a:r>
+              <a:rPr b="0" lang="en-US" sz="2000" spc="-1" strike="noStrike">
+                <a:solidFill>
+                  <a:srgbClr val="000000"/>
+                </a:solidFill>
+                <a:latin typeface="Arial"/>
+              </a:rPr>
+              <a:t>“</a:t>
+            </a:r>
+            <a:r>
+              <a:rPr b="1" lang="en-US" sz="2000" spc="-1" strike="noStrike">
+                <a:solidFill>
+                  <a:srgbClr val="000000"/>
+                </a:solidFill>
+                <a:latin typeface="Courier New"/>
+              </a:rPr>
+              <a:t>DATA 1234</a:t>
+            </a:r>
+            <a:r>
+              <a:rPr b="0" lang="en-US" sz="2000" spc="-1" strike="noStrike">
+                <a:solidFill>
+                  <a:srgbClr val="000000"/>
+                </a:solidFill>
+                <a:latin typeface="Arial"/>
+              </a:rPr>
+              <a:t>”   → </a:t>
+            </a:r>
+            <a:endParaRPr b="0" lang="en-US" sz="2000" spc="-1" strike="noStrike">
+              <a:solidFill>
+                <a:srgbClr val="000000"/>
+              </a:solidFill>
+              <a:latin typeface="Arial"/>
+            </a:endParaRPr>
+          </a:p>
+          <a:p>
+            <a:pPr indent="0" algn="r">
+              <a:spcAft>
+                <a:spcPts val="1054"/>
+              </a:spcAft>
+              <a:buNone/>
+            </a:pPr>
+            <a:r>
+              <a:rPr b="0" lang="en-US" sz="2000" spc="-1" strike="noStrike">
+                <a:solidFill>
+                  <a:srgbClr val="000000"/>
+                </a:solidFill>
+                <a:latin typeface="Arial"/>
+              </a:rPr>
+              <a:t> ←   “</a:t>
+            </a:r>
+            <a:r>
+              <a:rPr b="1" lang="en-US" sz="2000" spc="-1" strike="noStrike">
+                <a:solidFill>
+                  <a:srgbClr val="000000"/>
+                </a:solidFill>
+                <a:latin typeface="Courier New"/>
+              </a:rPr>
+              <a:t>PEEK 1234</a:t>
+            </a:r>
+            <a:r>
+              <a:rPr b="0" lang="en-US" sz="2000" spc="-1" strike="noStrike">
+                <a:solidFill>
+                  <a:srgbClr val="000000"/>
+                </a:solidFill>
+                <a:latin typeface="Arial"/>
+              </a:rPr>
+              <a:t>”</a:t>
+            </a:r>
+            <a:endParaRPr b="0" lang="en-US" sz="2000" spc="-1" strike="noStrike">
+              <a:solidFill>
+                <a:srgbClr val="000000"/>
+              </a:solidFill>
+              <a:latin typeface="Arial"/>
+            </a:endParaRPr>
+          </a:p>
+          <a:p>
+            <a:pPr indent="0">
+              <a:spcAft>
+                <a:spcPts val="1054"/>
+              </a:spcAft>
+              <a:buNone/>
+            </a:pPr>
+            <a:r>
+              <a:rPr b="0" i="1" lang="en-US" sz="2000" spc="-1" strike="noStrike">
+                <a:solidFill>
+                  <a:srgbClr val="000000"/>
+                </a:solidFill>
+                <a:latin typeface="Arial"/>
+              </a:rPr>
+              <a:t>1234 bytes of data</a:t>
+            </a:r>
+            <a:r>
+              <a:rPr b="0" i="1" lang="en-US" sz="2000" spc="-1" strike="noStrike">
+                <a:solidFill>
+                  <a:srgbClr val="000000"/>
+                </a:solidFill>
+                <a:latin typeface="Arial"/>
+              </a:rPr>
+              <a:t>   → </a:t>
+            </a:r>
+            <a:endParaRPr b="0" lang="en-US" sz="2000" spc="-1" strike="noStrike">
+              <a:solidFill>
+                <a:srgbClr val="000000"/>
+              </a:solidFill>
+              <a:latin typeface="Arial"/>
+            </a:endParaRPr>
+          </a:p>
+          <a:p>
+            <a:pPr indent="0" algn="r">
+              <a:spcAft>
+                <a:spcPts val="1054"/>
+              </a:spcAft>
+              <a:buNone/>
+            </a:pPr>
+            <a:r>
+              <a:rPr b="0" lang="en-US" sz="2000" spc="-1" strike="noStrike">
+                <a:solidFill>
+                  <a:srgbClr val="000000"/>
+                </a:solidFill>
+                <a:latin typeface="Arial"/>
+              </a:rPr>
+              <a:t> ←   “</a:t>
+            </a:r>
+            <a:r>
+              <a:rPr b="1" lang="en-US" sz="2000" spc="-1" strike="noStrike">
+                <a:solidFill>
+                  <a:srgbClr val="000000"/>
+                </a:solidFill>
+                <a:latin typeface="Courier New"/>
+              </a:rPr>
+              <a:t>NEXT</a:t>
+            </a:r>
+            <a:r>
+              <a:rPr b="0" lang="en-US" sz="2000" spc="-1" strike="noStrike">
+                <a:solidFill>
+                  <a:srgbClr val="000000"/>
+                </a:solidFill>
+                <a:latin typeface="Arial"/>
+              </a:rPr>
+              <a:t>”</a:t>
+            </a:r>
+            <a:endParaRPr b="0" lang="en-US" sz="2000" spc="-1" strike="noStrike">
+              <a:solidFill>
+                <a:srgbClr val="000000"/>
+              </a:solidFill>
+              <a:latin typeface="Arial"/>
+            </a:endParaRPr>
+          </a:p>
+          <a:p>
+            <a:pPr indent="0">
+              <a:spcAft>
+                <a:spcPts val="1054"/>
+              </a:spcAft>
+              <a:buNone/>
+            </a:pPr>
+            <a:r>
+              <a:rPr b="0" lang="en-US" sz="2000" spc="-1" strike="noStrike">
+                <a:solidFill>
+                  <a:srgbClr val="000000"/>
+                </a:solidFill>
+                <a:latin typeface="Arial"/>
+              </a:rPr>
+              <a:t>“</a:t>
+            </a:r>
+            <a:r>
+              <a:rPr b="1" lang="en-US" sz="2000" spc="-1" strike="noStrike">
+                <a:solidFill>
+                  <a:srgbClr val="000000"/>
+                </a:solidFill>
+                <a:latin typeface="Courier New"/>
+              </a:rPr>
+              <a:t>OKAY</a:t>
+            </a:r>
+            <a:r>
+              <a:rPr b="0" lang="en-US" sz="2000" spc="-1" strike="noStrike">
+                <a:solidFill>
+                  <a:srgbClr val="000000"/>
+                </a:solidFill>
+                <a:latin typeface="Arial"/>
+              </a:rPr>
+              <a:t>”</a:t>
+            </a:r>
+            <a:r>
+              <a:rPr b="0" lang="en-US" sz="2000" spc="-1" strike="noStrike">
+                <a:solidFill>
+                  <a:srgbClr val="000000"/>
+                </a:solidFill>
+                <a:latin typeface="Arial"/>
+              </a:rPr>
+              <a:t>   → </a:t>
+            </a:r>
+            <a:endParaRPr b="0" lang="en-US" sz="2000" spc="-1" strike="noStrike">
+              <a:solidFill>
+                <a:srgbClr val="000000"/>
+              </a:solidFill>
+              <a:latin typeface="Arial"/>
+            </a:endParaRPr>
+          </a:p>
+          <a:p>
+            <a:pPr indent="0">
+              <a:spcAft>
+                <a:spcPts val="1054"/>
+              </a:spcAft>
+              <a:buNone/>
+            </a:pPr>
+            <a:endParaRPr b="0" lang="en-US" sz="2000" spc="-1" strike="noStrike">
+              <a:solidFill>
+                <a:srgbClr val="000000"/>
+              </a:solidFill>
+              <a:latin typeface="Arial"/>
+            </a:endParaRPr>
+          </a:p>
           <a:p>
             <a:pPr indent="0">
               <a:spcAft>

</xml_diff>

<commit_message>
updates to PPT deck for 2023-06-16
</commit_message>
<xml_diff>
--- a/doc/duckwork.pptx
+++ b/doc/duckwork.pptx
@@ -75,7 +75,7 @@
         <p:txBody>
           <a:bodyPr/>
           <a:p>
-            <a:fld id="{18A69B8A-D5C1-4852-B98F-262EC7476159}" type="slidenum">
+            <a:fld id="{937D7D79-5E0E-4138-8338-3895D3F71679}" type="slidenum">
               <a:t>&lt;#&gt;</a:t>
             </a:fld>
           </a:p>
@@ -284,7 +284,7 @@
         <p:txBody>
           <a:bodyPr/>
           <a:p>
-            <a:fld id="{AF5982A5-6BB0-4C35-8224-1F9D62DF71D2}" type="slidenum">
+            <a:fld id="{8BADEC5C-6328-46B3-8A50-181B21688D02}" type="slidenum">
               <a:t>&lt;#&gt;</a:t>
             </a:fld>
           </a:p>
@@ -579,7 +579,7 @@
         <p:txBody>
           <a:bodyPr/>
           <a:p>
-            <a:fld id="{9C49EA2A-BE8C-429E-9C06-CAA17DC150BC}" type="slidenum">
+            <a:fld id="{168D8F2A-2FBE-46B3-9CC2-5C40378441E2}" type="slidenum">
               <a:t>&lt;#&gt;</a:t>
             </a:fld>
           </a:p>
@@ -960,7 +960,7 @@
         <p:txBody>
           <a:bodyPr/>
           <a:p>
-            <a:fld id="{44E243D2-2A77-4668-A7A4-3E81439FE87F}" type="slidenum">
+            <a:fld id="{C5441C5D-46B3-445C-BBD2-2D5B41378122}" type="slidenum">
               <a:t>&lt;#&gt;</a:t>
             </a:fld>
           </a:p>
@@ -1123,7 +1123,7 @@
         <p:txBody>
           <a:bodyPr/>
           <a:p>
-            <a:fld id="{2A52F1CF-4C00-43FA-8DEE-22C27F5DAE50}" type="slidenum">
+            <a:fld id="{008078EA-D23A-424A-9627-9CA9F6181A20}" type="slidenum">
               <a:t>&lt;#&gt;</a:t>
             </a:fld>
           </a:p>
@@ -1289,7 +1289,7 @@
         <p:txBody>
           <a:bodyPr/>
           <a:p>
-            <a:fld id="{56F81C5D-E201-4224-AD4B-0B1C9920CC01}" type="slidenum">
+            <a:fld id="{809D8204-E270-4FC0-959F-543343A2C447}" type="slidenum">
               <a:t>&lt;#&gt;</a:t>
             </a:fld>
           </a:p>
@@ -1498,7 +1498,7 @@
         <p:txBody>
           <a:bodyPr/>
           <a:p>
-            <a:fld id="{A2A82203-B2B9-49EF-B5C8-0A1CF693837B}" type="slidenum">
+            <a:fld id="{17AF6112-01D7-4BDC-9C0F-0BDE1B61ABE4}" type="slidenum">
               <a:t>&lt;#&gt;</a:t>
             </a:fld>
           </a:p>
@@ -1621,7 +1621,7 @@
         <p:txBody>
           <a:bodyPr/>
           <a:p>
-            <a:fld id="{191208D0-C5AA-4015-9AE6-9E0853418997}" type="slidenum">
+            <a:fld id="{5279EB76-4BCC-403E-8DA9-C110CE864B11}" type="slidenum">
               <a:t>&lt;#&gt;</a:t>
             </a:fld>
           </a:p>
@@ -1742,7 +1742,7 @@
         <p:txBody>
           <a:bodyPr/>
           <a:p>
-            <a:fld id="{7C7264F2-52FE-4628-A6DF-1E0187ED4328}" type="slidenum">
+            <a:fld id="{0CC58A9C-6471-473C-96A7-5CE52B78ECE9}" type="slidenum">
               <a:t>&lt;#&gt;</a:t>
             </a:fld>
           </a:p>
@@ -1994,7 +1994,7 @@
         <p:txBody>
           <a:bodyPr/>
           <a:p>
-            <a:fld id="{7814B1E0-03A3-4733-B929-8E78D3FCE71F}" type="slidenum">
+            <a:fld id="{4E8AF2E9-EE3E-4278-ACD2-61FE0E99B5FB}" type="slidenum">
               <a:t>&lt;#&gt;</a:t>
             </a:fld>
           </a:p>
@@ -2246,7 +2246,7 @@
         <p:txBody>
           <a:bodyPr/>
           <a:p>
-            <a:fld id="{46F23C90-0794-4F2A-A611-29F107EC8679}" type="slidenum">
+            <a:fld id="{9029624A-67FA-41B8-8C88-2AB64D6D7680}" type="slidenum">
               <a:t>&lt;#&gt;</a:t>
             </a:fld>
           </a:p>
@@ -2498,7 +2498,7 @@
         <p:txBody>
           <a:bodyPr/>
           <a:p>
-            <a:fld id="{98AAB573-FEBE-409C-992F-2A71ACA9577F}" type="slidenum">
+            <a:fld id="{DDE032B8-4BA6-4F8D-A8CA-182E5A6A9611}" type="slidenum">
               <a:t>&lt;#&gt;</a:t>
             </a:fld>
           </a:p>
@@ -3223,7 +3223,7 @@
             <a:pPr indent="0" algn="r">
               <a:buNone/>
             </a:pPr>
-            <a:fld id="{26A30E1B-FCAC-4B33-8E06-AFB943CDC3AD}" type="slidenum">
+            <a:fld id="{B0A1DCCD-FB49-4DC5-8049-FD96A7CCC67A}" type="slidenum">
               <a:rPr b="0" lang="en-US" sz="1400" spc="-1" strike="noStrike">
                 <a:solidFill>
                   <a:srgbClr val="eeeeee"/>
@@ -3437,7 +3437,7 @@
                 <a:latin typeface="Arial"/>
                 <a:ea typeface="DejaVu Sans"/>
               </a:rPr>
-              <a:t>2023 June 14</a:t>
+              <a:t>2023 June 16</a:t>
             </a:r>
             <a:endParaRPr b="0" lang="en-US" sz="1800" spc="-1" strike="noStrike">
               <a:solidFill>
@@ -4777,7 +4777,7 @@
                 </a:solidFill>
                 <a:latin typeface="Arial"/>
               </a:rPr>
-              <a:t>Impose minimal required infrastructure (e.g., no JVM needed) </a:t>
+              <a:t>Minimal required infrastructure (e.g., no JVM needed) </a:t>
             </a:r>
             <a:endParaRPr b="0" lang="en-US" sz="2000" spc="-1" strike="noStrike">
               <a:solidFill>
@@ -4995,7 +4995,19 @@
                 </a:solidFill>
                 <a:latin typeface="Arial"/>
               </a:rPr>
-              <a:t> system call returns a pair of file descriptors at the ends of a “leaky garden hose” </a:t>
+              <a:t> system call returns a pair of file descriptors </a:t>
+            </a:r>
+            <a:br>
+              <a:rPr sz="2000"/>
+            </a:br>
+            <a:r>
+              <a:rPr b="0" lang="en-US" sz="2000" spc="-1" strike="noStrike">
+                <a:solidFill>
+                  <a:srgbClr val="000000"/>
+                </a:solidFill>
+                <a:latin typeface="Arial"/>
+              </a:rPr>
+              <a:t>at the ends of a “leaky garden hose” </a:t>
             </a:r>
             <a:endParaRPr b="0" lang="en-US" sz="2000" spc="-1" strike="noStrike">
               <a:solidFill>
@@ -5017,6 +5029,15 @@
               <a:buChar char=""/>
             </a:pPr>
             <a:r>
+              <a:rPr b="0" lang="en-US" sz="2000" spc="-1" strike="noStrike">
+                <a:solidFill>
+                  <a:srgbClr val="000000"/>
+                </a:solidFill>
+                <a:latin typeface="Arial"/>
+              </a:rPr>
+              <a:t>Garden hose </a:t>
+            </a:r>
+            <a:r>
               <a:rPr b="1" lang="en-US" sz="2000" spc="-1" strike="noStrike">
                 <a:solidFill>
                   <a:srgbClr val="000000"/>
@@ -5032,7 +5053,19 @@
                 </a:solidFill>
                 <a:latin typeface="Arial"/>
               </a:rPr>
-              <a:t> does not block at record boundaries, but </a:t>
+              <a:t> does not block at record boundaries, </a:t>
+            </a:r>
+            <a:br>
+              <a:rPr sz="2000"/>
+            </a:br>
+            <a:r>
+              <a:rPr b="0" lang="en-US" sz="2000" spc="-1" strike="noStrike">
+                <a:solidFill>
+                  <a:srgbClr val="000000"/>
+                </a:solidFill>
+                <a:latin typeface="Arial"/>
+              </a:rPr>
+              <a:t>but </a:t>
             </a:r>
             <a:r>
               <a:rPr b="1" lang="en-US" sz="2000" spc="-1" strike="noStrike">
@@ -5143,7 +5176,7 @@
                 </a:solidFill>
                 <a:latin typeface="Arial"/>
               </a:rPr>
-              <a:t> on a reverse pipe until consumer says “go” then sends the record down the forward pipe and waits for “done” from consumer </a:t>
+              <a:t> on a reverse pipe until consumer says “go”, then sends the record down the forward pipe and waits for “done” from consumer </a:t>
             </a:r>
             <a:endParaRPr b="0" lang="en-US" sz="2000" spc="-1" strike="noStrike">
               <a:solidFill>
@@ -5329,7 +5362,7 @@
                 </a:solidFill>
                 <a:latin typeface="Arial"/>
               </a:rPr>
-              <a:t>Start with that because it is known to work. </a:t>
+              <a:t>But start with that because it is known to work. </a:t>
             </a:r>
             <a:endParaRPr b="0" lang="en-US" sz="2000" spc="-1" strike="noStrike">
               <a:solidFill>
@@ -5924,7 +5957,7 @@
                 </a:solidFill>
                 <a:latin typeface="Arial"/>
               </a:rPr>
-              <a:t>Connector Descriptor passed from dispatcher to stages </a:t>
+              <a:t>Connector Descriptor passed from dispatcher to stages in environment vars </a:t>
             </a:r>
             <a:endParaRPr b="0" lang="en-US" sz="2000" spc="-1" strike="noStrike">
               <a:solidFill>

</xml_diff>